<commit_message>
2. Version von Präsi1
hoffentlich final ;)
</commit_message>
<xml_diff>
--- a/Doku/Praesi1.pptx
+++ b/Doku/Praesi1.pptx
@@ -12,7 +12,7 @@
     <p:sldId id="273" r:id="rId6"/>
     <p:sldId id="274" r:id="rId7"/>
     <p:sldId id="275" r:id="rId8"/>
-    <p:sldId id="277" r:id="rId9"/>
+    <p:sldId id="286" r:id="rId9"/>
     <p:sldId id="278" r:id="rId10"/>
     <p:sldId id="279" r:id="rId11"/>
     <p:sldId id="280" r:id="rId12"/>
@@ -20,11 +20,15 @@
     <p:sldId id="282" r:id="rId14"/>
     <p:sldId id="283" r:id="rId15"/>
     <p:sldId id="284" r:id="rId16"/>
-    <p:sldId id="285" r:id="rId17"/>
-    <p:sldId id="266" r:id="rId18"/>
-    <p:sldId id="268" r:id="rId19"/>
-    <p:sldId id="267" r:id="rId20"/>
-    <p:sldId id="276" r:id="rId21"/>
+    <p:sldId id="287" r:id="rId17"/>
+    <p:sldId id="285" r:id="rId18"/>
+    <p:sldId id="266" r:id="rId19"/>
+    <p:sldId id="289" r:id="rId20"/>
+    <p:sldId id="288" r:id="rId21"/>
+    <p:sldId id="268" r:id="rId22"/>
+    <p:sldId id="290" r:id="rId23"/>
+    <p:sldId id="267" r:id="rId24"/>
+    <p:sldId id="276" r:id="rId25"/>
   </p:sldIdLst>
   <p:sldSz cx="9144000" cy="6858000" type="screen4x3"/>
   <p:notesSz cx="6858000" cy="9144000"/>
@@ -307,7 +311,7 @@
           <a:p>
             <a:fld id="{CF2933F3-F04D-48C8-9880-7A8EA4FF7473}" type="datetimeFigureOut">
               <a:rPr lang="de-DE" smtClean="0"/>
-              <a:t>10.11.2014</a:t>
+              <a:t>12.11.2014</a:t>
             </a:fld>
             <a:endParaRPr lang="de-DE"/>
           </a:p>
@@ -477,7 +481,7 @@
           <a:p>
             <a:fld id="{CF2933F3-F04D-48C8-9880-7A8EA4FF7473}" type="datetimeFigureOut">
               <a:rPr lang="de-DE" smtClean="0"/>
-              <a:t>10.11.2014</a:t>
+              <a:t>12.11.2014</a:t>
             </a:fld>
             <a:endParaRPr lang="de-DE"/>
           </a:p>
@@ -657,7 +661,7 @@
           <a:p>
             <a:fld id="{CF2933F3-F04D-48C8-9880-7A8EA4FF7473}" type="datetimeFigureOut">
               <a:rPr lang="de-DE" smtClean="0"/>
-              <a:t>10.11.2014</a:t>
+              <a:t>12.11.2014</a:t>
             </a:fld>
             <a:endParaRPr lang="de-DE"/>
           </a:p>
@@ -827,7 +831,7 @@
           <a:p>
             <a:fld id="{CF2933F3-F04D-48C8-9880-7A8EA4FF7473}" type="datetimeFigureOut">
               <a:rPr lang="de-DE" smtClean="0"/>
-              <a:t>10.11.2014</a:t>
+              <a:t>12.11.2014</a:t>
             </a:fld>
             <a:endParaRPr lang="de-DE"/>
           </a:p>
@@ -1073,7 +1077,7 @@
           <a:p>
             <a:fld id="{CF2933F3-F04D-48C8-9880-7A8EA4FF7473}" type="datetimeFigureOut">
               <a:rPr lang="de-DE" smtClean="0"/>
-              <a:t>10.11.2014</a:t>
+              <a:t>12.11.2014</a:t>
             </a:fld>
             <a:endParaRPr lang="de-DE"/>
           </a:p>
@@ -1361,7 +1365,7 @@
           <a:p>
             <a:fld id="{CF2933F3-F04D-48C8-9880-7A8EA4FF7473}" type="datetimeFigureOut">
               <a:rPr lang="de-DE" smtClean="0"/>
-              <a:t>10.11.2014</a:t>
+              <a:t>12.11.2014</a:t>
             </a:fld>
             <a:endParaRPr lang="de-DE"/>
           </a:p>
@@ -1783,7 +1787,7 @@
           <a:p>
             <a:fld id="{CF2933F3-F04D-48C8-9880-7A8EA4FF7473}" type="datetimeFigureOut">
               <a:rPr lang="de-DE" smtClean="0"/>
-              <a:t>10.11.2014</a:t>
+              <a:t>12.11.2014</a:t>
             </a:fld>
             <a:endParaRPr lang="de-DE"/>
           </a:p>
@@ -1901,7 +1905,7 @@
           <a:p>
             <a:fld id="{CF2933F3-F04D-48C8-9880-7A8EA4FF7473}" type="datetimeFigureOut">
               <a:rPr lang="de-DE" smtClean="0"/>
-              <a:t>10.11.2014</a:t>
+              <a:t>12.11.2014</a:t>
             </a:fld>
             <a:endParaRPr lang="de-DE"/>
           </a:p>
@@ -1996,7 +2000,7 @@
           <a:p>
             <a:fld id="{CF2933F3-F04D-48C8-9880-7A8EA4FF7473}" type="datetimeFigureOut">
               <a:rPr lang="de-DE" smtClean="0"/>
-              <a:t>10.11.2014</a:t>
+              <a:t>12.11.2014</a:t>
             </a:fld>
             <a:endParaRPr lang="de-DE"/>
           </a:p>
@@ -2273,7 +2277,7 @@
           <a:p>
             <a:fld id="{CF2933F3-F04D-48C8-9880-7A8EA4FF7473}" type="datetimeFigureOut">
               <a:rPr lang="de-DE" smtClean="0"/>
-              <a:t>10.11.2014</a:t>
+              <a:t>12.11.2014</a:t>
             </a:fld>
             <a:endParaRPr lang="de-DE"/>
           </a:p>
@@ -2526,7 +2530,7 @@
           <a:p>
             <a:fld id="{CF2933F3-F04D-48C8-9880-7A8EA4FF7473}" type="datetimeFigureOut">
               <a:rPr lang="de-DE" smtClean="0"/>
-              <a:t>10.11.2014</a:t>
+              <a:t>12.11.2014</a:t>
             </a:fld>
             <a:endParaRPr lang="de-DE"/>
           </a:p>
@@ -2739,7 +2743,7 @@
           <a:p>
             <a:fld id="{CF2933F3-F04D-48C8-9880-7A8EA4FF7473}" type="datetimeFigureOut">
               <a:rPr lang="de-DE" smtClean="0"/>
-              <a:t>10.11.2014</a:t>
+              <a:t>12.11.2014</a:t>
             </a:fld>
             <a:endParaRPr lang="de-DE"/>
           </a:p>
@@ -3515,15 +3519,7 @@
                   <a:schemeClr val="bg1"/>
                 </a:solidFill>
               </a:rPr>
-              <a:t>  </a:t>
-            </a:r>
-            <a:r>
-              <a:rPr lang="de-DE" sz="2800" dirty="0" smtClean="0">
-                <a:solidFill>
-                  <a:schemeClr val="bg1"/>
-                </a:solidFill>
-              </a:rPr>
-              <a:t>Strukturplan</a:t>
+              <a:t>  Strukturplan</a:t>
             </a:r>
             <a:endParaRPr lang="de-DE" sz="2800" dirty="0">
               <a:solidFill>
@@ -3625,9 +3621,6 @@
           </a:p>
           <a:p>
             <a:pPr marL="742950" lvl="1" indent="-285750">
-              <a:lnSpc>
-                <a:spcPct val="150000"/>
-              </a:lnSpc>
               <a:buFont typeface="Arial" panose="020B0604020202020204" pitchFamily="34" charset="0"/>
               <a:buChar char="•"/>
             </a:pPr>
@@ -3810,15 +3803,7 @@
                   <a:schemeClr val="bg1"/>
                 </a:solidFill>
               </a:rPr>
-              <a:t>  </a:t>
-            </a:r>
-            <a:r>
-              <a:rPr lang="de-DE" sz="2800" dirty="0" smtClean="0">
-                <a:solidFill>
-                  <a:schemeClr val="bg1"/>
-                </a:solidFill>
-              </a:rPr>
-              <a:t>Strukturplan</a:t>
+              <a:t>  Strukturplan</a:t>
             </a:r>
             <a:endParaRPr lang="de-DE" sz="2800" dirty="0">
               <a:solidFill>
@@ -4142,15 +4127,7 @@
                   <a:schemeClr val="bg1"/>
                 </a:solidFill>
               </a:rPr>
-              <a:t>  </a:t>
-            </a:r>
-            <a:r>
-              <a:rPr lang="de-DE" sz="2800" dirty="0" smtClean="0">
-                <a:solidFill>
-                  <a:schemeClr val="bg1"/>
-                </a:solidFill>
-              </a:rPr>
-              <a:t>Strukturplan</a:t>
+              <a:t>  Strukturplan</a:t>
             </a:r>
             <a:endParaRPr lang="de-DE" sz="2800" dirty="0">
               <a:solidFill>
@@ -4278,9 +4255,6 @@
           </a:p>
           <a:p>
             <a:pPr marL="742950" lvl="1" indent="-285750">
-              <a:lnSpc>
-                <a:spcPct val="150000"/>
-              </a:lnSpc>
               <a:buFont typeface="Arial" panose="020B0604020202020204" pitchFamily="34" charset="0"/>
               <a:buChar char="•"/>
             </a:pPr>
@@ -4437,15 +4411,7 @@
                   <a:schemeClr val="bg1"/>
                 </a:solidFill>
               </a:rPr>
-              <a:t>  </a:t>
-            </a:r>
-            <a:r>
-              <a:rPr lang="de-DE" sz="2800" dirty="0" smtClean="0">
-                <a:solidFill>
-                  <a:schemeClr val="bg1"/>
-                </a:solidFill>
-              </a:rPr>
-              <a:t>Strukturplan</a:t>
+              <a:t>  Strukturplan</a:t>
             </a:r>
             <a:endParaRPr lang="de-DE" sz="2800" dirty="0">
               <a:solidFill>
@@ -4749,15 +4715,7 @@
                   <a:schemeClr val="bg1"/>
                 </a:solidFill>
               </a:rPr>
-              <a:t>  </a:t>
-            </a:r>
-            <a:r>
-              <a:rPr lang="de-DE" sz="2800" dirty="0" smtClean="0">
-                <a:solidFill>
-                  <a:schemeClr val="bg1"/>
-                </a:solidFill>
-              </a:rPr>
-              <a:t>Strukturplan</a:t>
+              <a:t>  Strukturplan</a:t>
             </a:r>
             <a:endParaRPr lang="de-DE" sz="2800" dirty="0">
               <a:solidFill>
@@ -5061,15 +5019,7 @@
                   <a:schemeClr val="bg1"/>
                 </a:solidFill>
               </a:rPr>
-              <a:t>  </a:t>
-            </a:r>
-            <a:r>
-              <a:rPr lang="de-DE" sz="2800" dirty="0" smtClean="0">
-                <a:solidFill>
-                  <a:schemeClr val="bg1"/>
-                </a:solidFill>
-              </a:rPr>
-              <a:t>Termin- und Meilensteinplanung</a:t>
+              <a:t>  Termin- und Meilensteinplanung</a:t>
             </a:r>
             <a:endParaRPr lang="de-DE" sz="2800" dirty="0">
               <a:solidFill>
@@ -5369,12 +5319,20 @@
               <a:t>  </a:t>
             </a:r>
             <a:r>
+              <a:rPr lang="de-DE" sz="2800" dirty="0" err="1" smtClean="0">
+                <a:solidFill>
+                  <a:schemeClr val="bg1"/>
+                </a:solidFill>
+              </a:rPr>
+              <a:t>Teamplan</a:t>
+            </a:r>
+            <a:r>
               <a:rPr lang="de-DE" sz="2800" dirty="0" smtClean="0">
                 <a:solidFill>
                   <a:schemeClr val="bg1"/>
                 </a:solidFill>
               </a:rPr>
-              <a:t>Termin- und Meilensteinplanung</a:t>
+              <a:t> / Aufwandsplan</a:t>
             </a:r>
             <a:endParaRPr lang="de-DE" sz="2800" dirty="0">
               <a:solidFill>
@@ -5384,62 +5342,158 @@
           </a:p>
         </p:txBody>
       </p:sp>
-      <p:pic>
-        <p:nvPicPr>
-          <p:cNvPr id="5122" name="Picture 2"/>
-          <p:cNvPicPr>
-            <a:picLocks noChangeAspect="1" noChangeArrowheads="1"/>
-          </p:cNvPicPr>
+      <p:sp>
+        <p:nvSpPr>
+          <p:cNvPr id="3" name="Textfeld 2"/>
+          <p:cNvSpPr txBox="1"/>
           <p:nvPr/>
-        </p:nvPicPr>
-        <p:blipFill rotWithShape="1">
-          <a:blip r:embed="rId3">
-            <a:extLst>
-              <a:ext uri="{28A0092B-C50C-407E-A947-70E740481C1C}">
-                <a14:useLocalDpi xmlns:a14="http://schemas.microsoft.com/office/drawing/2010/main" val="0"/>
-              </a:ext>
-            </a:extLst>
-          </a:blip>
-          <a:srcRect l="2456" t="18544" r="4828" b="37165"/>
-          <a:stretch/>
-        </p:blipFill>
-        <p:spPr bwMode="auto">
+        </p:nvSpPr>
+        <p:spPr>
           <a:xfrm>
-            <a:off x="299545" y="1907628"/>
-            <a:ext cx="8598018" cy="3465588"/>
+            <a:off x="385639" y="836712"/>
+            <a:ext cx="8352928" cy="5262979"/>
           </a:xfrm>
           <a:prstGeom prst="rect">
             <a:avLst/>
           </a:prstGeom>
           <a:noFill/>
-          <a:ln>
-            <a:noFill/>
-          </a:ln>
-          <a:extLst>
-            <a:ext uri="{909E8E84-426E-40DD-AFC4-6F175D3DCCD1}">
-              <a14:hiddenFill xmlns:a14="http://schemas.microsoft.com/office/drawing/2010/main">
+        </p:spPr>
+        <p:txBody>
+          <a:bodyPr wrap="square" rtlCol="0">
+            <a:spAutoFit/>
+          </a:bodyPr>
+          <a:lstStyle/>
+          <a:p>
+            <a:pPr>
+              <a:lnSpc>
+                <a:spcPct val="150000"/>
+              </a:lnSpc>
+            </a:pPr>
+            <a:r>
+              <a:rPr lang="de-DE" sz="2800" b="1" dirty="0" err="1" smtClean="0">
                 <a:solidFill>
                   <a:schemeClr val="accent1"/>
                 </a:solidFill>
-              </a14:hiddenFill>
-            </a:ext>
-            <a:ext uri="{91240B29-F687-4F45-9708-019B960494DF}">
-              <a14:hiddenLine xmlns:a14="http://schemas.microsoft.com/office/drawing/2010/main" w="9525">
-                <a:solidFill>
-                  <a:schemeClr val="tx1"/>
-                </a:solidFill>
-                <a:miter lim="800000"/>
-                <a:headEnd/>
-                <a:tailEnd/>
-              </a14:hiddenLine>
-            </a:ext>
-          </a:extLst>
-        </p:spPr>
-      </p:pic>
+              </a:rPr>
+              <a:t>Teamplan</a:t>
+            </a:r>
+            <a:endParaRPr lang="de-DE" sz="2800" b="1" dirty="0" smtClean="0">
+              <a:solidFill>
+                <a:schemeClr val="accent1"/>
+              </a:solidFill>
+            </a:endParaRPr>
+          </a:p>
+          <a:p>
+            <a:pPr marL="457200" indent="-457200">
+              <a:lnSpc>
+                <a:spcPct val="150000"/>
+              </a:lnSpc>
+              <a:buFont typeface="Arial" panose="020B0604020202020204" pitchFamily="34" charset="0"/>
+              <a:buChar char="•"/>
+            </a:pPr>
+            <a:r>
+              <a:rPr lang="de-DE" sz="2800" dirty="0" smtClean="0"/>
+              <a:t>Alle Projektmitglieder jeweils 8 Std./</a:t>
+            </a:r>
+            <a:r>
+              <a:rPr lang="de-DE" sz="2800" dirty="0" smtClean="0"/>
+              <a:t>W</a:t>
+            </a:r>
+            <a:r>
+              <a:rPr lang="de-DE" sz="2800" dirty="0" smtClean="0"/>
+              <a:t>oche</a:t>
+            </a:r>
+          </a:p>
+          <a:p>
+            <a:pPr marL="457200" indent="-457200">
+              <a:lnSpc>
+                <a:spcPct val="150000"/>
+              </a:lnSpc>
+              <a:buFont typeface="Arial" panose="020B0604020202020204" pitchFamily="34" charset="0"/>
+              <a:buChar char="•"/>
+            </a:pPr>
+            <a:r>
+              <a:rPr lang="de-DE" sz="2800" dirty="0" smtClean="0"/>
+              <a:t>Ca. 60% der noch verfügbaren Zeitressourcen</a:t>
+            </a:r>
+          </a:p>
+          <a:p>
+            <a:pPr marL="457200" indent="-457200">
+              <a:lnSpc>
+                <a:spcPct val="150000"/>
+              </a:lnSpc>
+              <a:buFont typeface="Arial" panose="020B0604020202020204" pitchFamily="34" charset="0"/>
+              <a:buChar char="•"/>
+            </a:pPr>
+            <a:endParaRPr lang="de-DE" sz="2800" dirty="0"/>
+          </a:p>
+          <a:p>
+            <a:pPr>
+              <a:lnSpc>
+                <a:spcPct val="150000"/>
+              </a:lnSpc>
+            </a:pPr>
+            <a:r>
+              <a:rPr lang="de-DE" sz="2800" b="1" dirty="0" smtClean="0">
+                <a:solidFill>
+                  <a:schemeClr val="accent1"/>
+                </a:solidFill>
+              </a:rPr>
+              <a:t>Aufwandsplan</a:t>
+            </a:r>
+          </a:p>
+          <a:p>
+            <a:pPr marL="457200" indent="-457200">
+              <a:lnSpc>
+                <a:spcPct val="150000"/>
+              </a:lnSpc>
+              <a:buFont typeface="Arial" panose="020B0604020202020204" pitchFamily="34" charset="0"/>
+              <a:buChar char="•"/>
+            </a:pPr>
+            <a:r>
+              <a:rPr lang="de-DE" sz="2800" dirty="0" smtClean="0"/>
+              <a:t>Fertigstellung dieses Jahr (52. KW)</a:t>
+            </a:r>
+          </a:p>
+          <a:p>
+            <a:pPr marL="457200" indent="-457200">
+              <a:lnSpc>
+                <a:spcPct val="150000"/>
+              </a:lnSpc>
+              <a:buFont typeface="Arial" panose="020B0604020202020204" pitchFamily="34" charset="0"/>
+              <a:buChar char="•"/>
+            </a:pPr>
+            <a:r>
+              <a:rPr lang="de-DE" sz="2800" dirty="0" smtClean="0">
+                <a:sym typeface="Wingdings" panose="05000000000000000000" pitchFamily="2" charset="2"/>
+              </a:rPr>
+              <a:t>13 Wochen * 5 Projektmitglieder * 8 Std.</a:t>
+            </a:r>
+            <a:br>
+              <a:rPr lang="de-DE" sz="2800" dirty="0" smtClean="0">
+                <a:sym typeface="Wingdings" panose="05000000000000000000" pitchFamily="2" charset="2"/>
+              </a:rPr>
+            </a:br>
+            <a:r>
+              <a:rPr lang="de-DE" sz="2800" dirty="0" smtClean="0">
+                <a:sym typeface="Wingdings" panose="05000000000000000000" pitchFamily="2" charset="2"/>
+              </a:rPr>
+              <a:t> Gesamtaufwand: </a:t>
+            </a:r>
+            <a:r>
+              <a:rPr lang="de-DE" sz="2800" b="1" dirty="0" smtClean="0">
+                <a:sym typeface="Wingdings" panose="05000000000000000000" pitchFamily="2" charset="2"/>
+              </a:rPr>
+              <a:t>520 Std.</a:t>
+            </a:r>
+            <a:endParaRPr lang="de-DE" sz="2800" b="1" dirty="0"/>
+          </a:p>
+        </p:txBody>
+      </p:sp>
     </p:spTree>
     <p:extLst>
       <p:ext uri="{BB962C8B-B14F-4D97-AF65-F5344CB8AC3E}">
-        <p14:creationId xmlns:p14="http://schemas.microsoft.com/office/powerpoint/2010/main" val="4283604313"/>
+        <p14:creationId xmlns:p14="http://schemas.microsoft.com/office/powerpoint/2010/main" val="1124097212"/>
       </p:ext>
     </p:extLst>
   </p:cSld>
@@ -5556,15 +5610,7 @@
                   <a:schemeClr val="bg1"/>
                 </a:solidFill>
               </a:rPr>
-              <a:t>  </a:t>
-            </a:r>
-            <a:r>
-              <a:rPr lang="de-DE" sz="2800" dirty="0" smtClean="0">
-                <a:solidFill>
-                  <a:schemeClr val="bg1"/>
-                </a:solidFill>
-              </a:rPr>
-              <a:t>Fachlicher Überblick - Geschäftsanwendungsfälle</a:t>
+              <a:t>  Termin- und Meilensteinplanung</a:t>
             </a:r>
             <a:endParaRPr lang="de-DE" sz="2800" dirty="0">
               <a:solidFill>
@@ -5574,10 +5620,62 @@
           </a:p>
         </p:txBody>
       </p:sp>
+      <p:pic>
+        <p:nvPicPr>
+          <p:cNvPr id="1027" name="Picture 3"/>
+          <p:cNvPicPr>
+            <a:picLocks noChangeAspect="1" noChangeArrowheads="1"/>
+          </p:cNvPicPr>
+          <p:nvPr/>
+        </p:nvPicPr>
+        <p:blipFill rotWithShape="1">
+          <a:blip r:embed="rId3">
+            <a:extLst>
+              <a:ext uri="{28A0092B-C50C-407E-A947-70E740481C1C}">
+                <a14:useLocalDpi xmlns:a14="http://schemas.microsoft.com/office/drawing/2010/main" val="0"/>
+              </a:ext>
+            </a:extLst>
+          </a:blip>
+          <a:srcRect l="18862" t="20523" r="24341" b="34362"/>
+          <a:stretch/>
+        </p:blipFill>
+        <p:spPr bwMode="auto">
+          <a:xfrm>
+            <a:off x="35496" y="844430"/>
+            <a:ext cx="9108504" cy="5879563"/>
+          </a:xfrm>
+          <a:prstGeom prst="rect">
+            <a:avLst/>
+          </a:prstGeom>
+          <a:noFill/>
+          <a:ln>
+            <a:noFill/>
+          </a:ln>
+          <a:extLst>
+            <a:ext uri="{909E8E84-426E-40DD-AFC4-6F175D3DCCD1}">
+              <a14:hiddenFill xmlns:a14="http://schemas.microsoft.com/office/drawing/2010/main">
+                <a:solidFill>
+                  <a:schemeClr val="accent1"/>
+                </a:solidFill>
+              </a14:hiddenFill>
+            </a:ext>
+            <a:ext uri="{91240B29-F687-4F45-9708-019B960494DF}">
+              <a14:hiddenLine xmlns:a14="http://schemas.microsoft.com/office/drawing/2010/main" w="9525">
+                <a:solidFill>
+                  <a:schemeClr val="tx1"/>
+                </a:solidFill>
+                <a:miter lim="800000"/>
+                <a:headEnd/>
+                <a:tailEnd/>
+              </a14:hiddenLine>
+            </a:ext>
+          </a:extLst>
+        </p:spPr>
+      </p:pic>
     </p:spTree>
     <p:extLst>
       <p:ext uri="{BB962C8B-B14F-4D97-AF65-F5344CB8AC3E}">
-        <p14:creationId xmlns:p14="http://schemas.microsoft.com/office/powerpoint/2010/main" val="1716214610"/>
+        <p14:creationId xmlns:p14="http://schemas.microsoft.com/office/powerpoint/2010/main" val="4283604313"/>
       </p:ext>
     </p:extLst>
   </p:cSld>
@@ -5694,15 +5792,7 @@
                   <a:schemeClr val="bg1"/>
                 </a:solidFill>
               </a:rPr>
-              <a:t>  </a:t>
-            </a:r>
-            <a:r>
-              <a:rPr lang="de-DE" sz="2800" dirty="0" smtClean="0">
-                <a:solidFill>
-                  <a:schemeClr val="bg1"/>
-                </a:solidFill>
-              </a:rPr>
-              <a:t>Fachlicher Überblick - Anforderungen</a:t>
+              <a:t>  Fachlicher Überblick - Geschäftsanwendungsfälle</a:t>
             </a:r>
             <a:endParaRPr lang="de-DE" sz="2800" dirty="0">
               <a:solidFill>
@@ -5712,10 +5802,214 @@
           </a:p>
         </p:txBody>
       </p:sp>
+      <p:sp>
+        <p:nvSpPr>
+          <p:cNvPr id="4" name="Textfeld 3"/>
+          <p:cNvSpPr txBox="1"/>
+          <p:nvPr/>
+        </p:nvSpPr>
+        <p:spPr>
+          <a:xfrm>
+            <a:off x="385638" y="836712"/>
+            <a:ext cx="8506841" cy="6001643"/>
+          </a:xfrm>
+          <a:prstGeom prst="rect">
+            <a:avLst/>
+          </a:prstGeom>
+          <a:noFill/>
+        </p:spPr>
+        <p:txBody>
+          <a:bodyPr wrap="square" rtlCol="0">
+            <a:spAutoFit/>
+          </a:bodyPr>
+          <a:lstStyle/>
+          <a:p>
+            <a:pPr>
+              <a:lnSpc>
+                <a:spcPct val="150000"/>
+              </a:lnSpc>
+              <a:tabLst>
+                <a:tab pos="2333625" algn="l"/>
+              </a:tabLst>
+            </a:pPr>
+            <a:r>
+              <a:rPr lang="de-DE" sz="3200" b="1" dirty="0" smtClean="0">
+                <a:solidFill>
+                  <a:schemeClr val="accent1"/>
+                </a:solidFill>
+              </a:rPr>
+              <a:t>BUC1: Stundenplan erstellen</a:t>
+            </a:r>
+          </a:p>
+          <a:p>
+            <a:pPr>
+              <a:lnSpc>
+                <a:spcPct val="150000"/>
+              </a:lnSpc>
+              <a:tabLst>
+                <a:tab pos="2333625" algn="l"/>
+              </a:tabLst>
+            </a:pPr>
+            <a:r>
+              <a:rPr lang="de-DE" sz="2800" b="1" dirty="0" smtClean="0">
+                <a:solidFill>
+                  <a:schemeClr val="accent1"/>
+                </a:solidFill>
+              </a:rPr>
+              <a:t>Auslöser: 	</a:t>
+            </a:r>
+            <a:r>
+              <a:rPr lang="de-DE" sz="2800" dirty="0" smtClean="0"/>
+              <a:t>Start Stundenplanerstellung</a:t>
+            </a:r>
+            <a:endParaRPr lang="de-DE" sz="2800" b="1" dirty="0" smtClean="0">
+              <a:solidFill>
+                <a:schemeClr val="accent1"/>
+              </a:solidFill>
+            </a:endParaRPr>
+          </a:p>
+          <a:p>
+            <a:pPr>
+              <a:lnSpc>
+                <a:spcPct val="150000"/>
+              </a:lnSpc>
+              <a:tabLst>
+                <a:tab pos="2333625" algn="l"/>
+              </a:tabLst>
+            </a:pPr>
+            <a:r>
+              <a:rPr lang="de-DE" sz="2800" b="1" dirty="0" smtClean="0">
+                <a:solidFill>
+                  <a:schemeClr val="accent1"/>
+                </a:solidFill>
+              </a:rPr>
+              <a:t>Vorbedingung: 	</a:t>
+            </a:r>
+            <a:r>
+              <a:rPr lang="de-DE" sz="2800" dirty="0" smtClean="0"/>
+              <a:t>Zeitpräferenzen der Dozenten 		müssen vorliegen</a:t>
+            </a:r>
+          </a:p>
+          <a:p>
+            <a:pPr>
+              <a:lnSpc>
+                <a:spcPct val="150000"/>
+              </a:lnSpc>
+              <a:tabLst>
+                <a:tab pos="2333625" algn="l"/>
+              </a:tabLst>
+            </a:pPr>
+            <a:r>
+              <a:rPr lang="de-DE" sz="2800" b="1" dirty="0" smtClean="0">
+                <a:solidFill>
+                  <a:schemeClr val="accent1"/>
+                </a:solidFill>
+              </a:rPr>
+              <a:t>Stakeholder:	</a:t>
+            </a:r>
+            <a:r>
+              <a:rPr lang="de-DE" sz="2800" dirty="0" smtClean="0"/>
+              <a:t>Dozent, Verwaltung, Studenten(indirekt)</a:t>
+            </a:r>
+          </a:p>
+          <a:p>
+            <a:pPr>
+              <a:lnSpc>
+                <a:spcPct val="150000"/>
+              </a:lnSpc>
+              <a:tabLst>
+                <a:tab pos="2333625" algn="l"/>
+              </a:tabLst>
+            </a:pPr>
+            <a:r>
+              <a:rPr lang="de-DE" sz="2800" b="1" dirty="0" smtClean="0">
+                <a:solidFill>
+                  <a:schemeClr val="accent1"/>
+                </a:solidFill>
+              </a:rPr>
+              <a:t>Output:	</a:t>
+            </a:r>
+            <a:r>
+              <a:rPr lang="de-DE" sz="2800" dirty="0" smtClean="0"/>
+              <a:t>Erfolg: Stundenplan eines Studiengangs</a:t>
+            </a:r>
+          </a:p>
+          <a:p>
+            <a:pPr>
+              <a:lnSpc>
+                <a:spcPct val="150000"/>
+              </a:lnSpc>
+              <a:tabLst>
+                <a:tab pos="2333625" algn="l"/>
+              </a:tabLst>
+            </a:pPr>
+            <a:r>
+              <a:rPr lang="de-DE" sz="2800" dirty="0"/>
+              <a:t>	</a:t>
+            </a:r>
+            <a:r>
+              <a:rPr lang="de-DE" sz="2800" dirty="0" smtClean="0"/>
+              <a:t>Misserfolg: kein Stundenplan</a:t>
+            </a:r>
+          </a:p>
+          <a:p>
+            <a:pPr>
+              <a:lnSpc>
+                <a:spcPct val="150000"/>
+              </a:lnSpc>
+              <a:tabLst>
+                <a:tab pos="2333625" algn="l"/>
+              </a:tabLst>
+            </a:pPr>
+            <a:r>
+              <a:rPr lang="de-DE" sz="2800" dirty="0"/>
+              <a:t>	</a:t>
+            </a:r>
+            <a:r>
+              <a:rPr lang="de-DE" sz="2800" dirty="0" smtClean="0"/>
+              <a:t>		    </a:t>
+            </a:r>
+            <a:r>
+              <a:rPr lang="de-DE" sz="2800" dirty="0" smtClean="0">
+                <a:sym typeface="Wingdings" panose="05000000000000000000" pitchFamily="2" charset="2"/>
+              </a:rPr>
+              <a:t> </a:t>
+            </a:r>
+            <a:r>
+              <a:rPr lang="de-DE" sz="2800" dirty="0" smtClean="0"/>
+              <a:t>Fehlermeldung</a:t>
+            </a:r>
+            <a:endParaRPr lang="de-DE" sz="2800" dirty="0" smtClean="0"/>
+          </a:p>
+          <a:p>
+            <a:pPr>
+              <a:lnSpc>
+                <a:spcPct val="150000"/>
+              </a:lnSpc>
+              <a:tabLst>
+                <a:tab pos="2333625" algn="l"/>
+              </a:tabLst>
+            </a:pPr>
+            <a:r>
+              <a:rPr lang="de-DE" sz="2800" b="1" dirty="0" smtClean="0">
+                <a:solidFill>
+                  <a:schemeClr val="accent1"/>
+                </a:solidFill>
+              </a:rPr>
+              <a:t>Ergebnis:	</a:t>
+            </a:r>
+            <a:r>
+              <a:rPr lang="de-DE" sz="2800" dirty="0" smtClean="0"/>
+              <a:t>Stundenplan wurde erstellt</a:t>
+            </a:r>
+            <a:endParaRPr lang="de-DE" sz="2800" dirty="0" smtClean="0"/>
+          </a:p>
+        </p:txBody>
+      </p:sp>
     </p:spTree>
     <p:extLst>
       <p:ext uri="{BB962C8B-B14F-4D97-AF65-F5344CB8AC3E}">
-        <p14:creationId xmlns:p14="http://schemas.microsoft.com/office/powerpoint/2010/main" val="245530455"/>
+        <p14:creationId xmlns:p14="http://schemas.microsoft.com/office/powerpoint/2010/main" val="1716214610"/>
       </p:ext>
     </p:extLst>
   </p:cSld>
@@ -5832,15 +6126,7 @@
                   <a:schemeClr val="bg1"/>
                 </a:solidFill>
               </a:rPr>
-              <a:t>  </a:t>
-            </a:r>
-            <a:r>
-              <a:rPr lang="de-DE" sz="2800" dirty="0" smtClean="0">
-                <a:solidFill>
-                  <a:schemeClr val="bg1"/>
-                </a:solidFill>
-              </a:rPr>
-              <a:t>Überblick technische Architektur</a:t>
+              <a:t>  Fachlicher Überblick - Geschäftsanwendungsfälle</a:t>
             </a:r>
             <a:endParaRPr lang="de-DE" sz="2800" dirty="0">
               <a:solidFill>
@@ -5850,51 +6136,204 @@
           </a:p>
         </p:txBody>
       </p:sp>
-      <p:pic>
-        <p:nvPicPr>
-          <p:cNvPr id="1026" name="Picture 2" descr="C:\Users\UBook\Documents\GitHub\Softwareprojekt_BIM\Technisches_Design\technische_architektur.png"/>
-          <p:cNvPicPr>
-            <a:picLocks noChangeAspect="1" noChangeArrowheads="1"/>
-          </p:cNvPicPr>
+      <p:sp>
+        <p:nvSpPr>
+          <p:cNvPr id="4" name="Textfeld 3"/>
+          <p:cNvSpPr txBox="1"/>
           <p:nvPr/>
-        </p:nvPicPr>
-        <p:blipFill>
-          <a:blip r:embed="rId3">
-            <a:extLst>
-              <a:ext uri="{28A0092B-C50C-407E-A947-70E740481C1C}">
-                <a14:useLocalDpi xmlns:a14="http://schemas.microsoft.com/office/drawing/2010/main" val="0"/>
-              </a:ext>
-            </a:extLst>
-          </a:blip>
-          <a:srcRect/>
-          <a:stretch>
-            <a:fillRect/>
-          </a:stretch>
-        </p:blipFill>
-        <p:spPr bwMode="auto">
+        </p:nvSpPr>
+        <p:spPr>
           <a:xfrm>
-            <a:off x="749841" y="932547"/>
-            <a:ext cx="7782650" cy="5534328"/>
+            <a:off x="385638" y="836712"/>
+            <a:ext cx="8506841" cy="5355312"/>
           </a:xfrm>
           <a:prstGeom prst="rect">
             <a:avLst/>
           </a:prstGeom>
           <a:noFill/>
-          <a:extLst>
-            <a:ext uri="{909E8E84-426E-40DD-AFC4-6F175D3DCCD1}">
-              <a14:hiddenFill xmlns:a14="http://schemas.microsoft.com/office/drawing/2010/main">
-                <a:solidFill>
-                  <a:srgbClr val="FFFFFF"/>
-                </a:solidFill>
-              </a14:hiddenFill>
-            </a:ext>
-          </a:extLst>
         </p:spPr>
-      </p:pic>
+        <p:txBody>
+          <a:bodyPr wrap="square" rtlCol="0">
+            <a:spAutoFit/>
+          </a:bodyPr>
+          <a:lstStyle/>
+          <a:p>
+            <a:pPr>
+              <a:lnSpc>
+                <a:spcPct val="150000"/>
+              </a:lnSpc>
+              <a:tabLst>
+                <a:tab pos="2333625" algn="l"/>
+              </a:tabLst>
+            </a:pPr>
+            <a:r>
+              <a:rPr lang="de-DE" sz="3200" b="1" dirty="0" smtClean="0">
+                <a:solidFill>
+                  <a:schemeClr val="accent1"/>
+                </a:solidFill>
+              </a:rPr>
+              <a:t>BUC2: Zeitpräferenzen der Dozenten erfassen</a:t>
+            </a:r>
+          </a:p>
+          <a:p>
+            <a:pPr>
+              <a:lnSpc>
+                <a:spcPct val="150000"/>
+              </a:lnSpc>
+              <a:tabLst>
+                <a:tab pos="2333625" algn="l"/>
+              </a:tabLst>
+            </a:pPr>
+            <a:r>
+              <a:rPr lang="de-DE" sz="2800" b="1" dirty="0" smtClean="0">
+                <a:solidFill>
+                  <a:schemeClr val="accent1"/>
+                </a:solidFill>
+              </a:rPr>
+              <a:t>Auslöser: 	</a:t>
+            </a:r>
+            <a:r>
+              <a:rPr lang="de-DE" sz="2800" dirty="0" smtClean="0"/>
+              <a:t>Kommunikationsaufbau vom/zum Dozent</a:t>
+            </a:r>
+            <a:endParaRPr lang="de-DE" sz="2800" b="1" dirty="0" smtClean="0">
+              <a:solidFill>
+                <a:schemeClr val="accent1"/>
+              </a:solidFill>
+            </a:endParaRPr>
+          </a:p>
+          <a:p>
+            <a:pPr>
+              <a:lnSpc>
+                <a:spcPct val="150000"/>
+              </a:lnSpc>
+              <a:tabLst>
+                <a:tab pos="2333625" algn="l"/>
+              </a:tabLst>
+            </a:pPr>
+            <a:r>
+              <a:rPr lang="de-DE" sz="2800" b="1" dirty="0" smtClean="0">
+                <a:solidFill>
+                  <a:schemeClr val="accent1"/>
+                </a:solidFill>
+              </a:rPr>
+              <a:t>Vorbedingung: 	</a:t>
+            </a:r>
+            <a:r>
+              <a:rPr lang="de-DE" sz="2800" dirty="0" smtClean="0"/>
+              <a:t>Planung für das neue Semester muss</a:t>
+            </a:r>
+          </a:p>
+          <a:p>
+            <a:pPr>
+              <a:lnSpc>
+                <a:spcPct val="150000"/>
+              </a:lnSpc>
+              <a:tabLst>
+                <a:tab pos="2333625" algn="l"/>
+              </a:tabLst>
+            </a:pPr>
+            <a:r>
+              <a:rPr lang="de-DE" sz="2800" dirty="0"/>
+              <a:t>	</a:t>
+            </a:r>
+            <a:r>
+              <a:rPr lang="de-DE" sz="2800" dirty="0" smtClean="0"/>
+              <a:t>begonnen haben</a:t>
+            </a:r>
+            <a:endParaRPr lang="de-DE" sz="2800" dirty="0" smtClean="0"/>
+          </a:p>
+          <a:p>
+            <a:pPr>
+              <a:lnSpc>
+                <a:spcPct val="150000"/>
+              </a:lnSpc>
+              <a:tabLst>
+                <a:tab pos="2333625" algn="l"/>
+              </a:tabLst>
+            </a:pPr>
+            <a:r>
+              <a:rPr lang="de-DE" sz="2800" b="1" dirty="0" smtClean="0">
+                <a:solidFill>
+                  <a:schemeClr val="accent1"/>
+                </a:solidFill>
+              </a:rPr>
+              <a:t>Stakeholder:	</a:t>
+            </a:r>
+            <a:r>
+              <a:rPr lang="de-DE" sz="2800" dirty="0" smtClean="0"/>
+              <a:t>Dozent, Verwaltung</a:t>
+            </a:r>
+          </a:p>
+          <a:p>
+            <a:pPr>
+              <a:lnSpc>
+                <a:spcPct val="150000"/>
+              </a:lnSpc>
+              <a:tabLst>
+                <a:tab pos="2333625" algn="l"/>
+              </a:tabLst>
+            </a:pPr>
+            <a:r>
+              <a:rPr lang="de-DE" sz="2800" b="1" dirty="0" smtClean="0">
+                <a:solidFill>
+                  <a:schemeClr val="accent1"/>
+                </a:solidFill>
+              </a:rPr>
+              <a:t>Output:	</a:t>
+            </a:r>
+            <a:r>
+              <a:rPr lang="de-DE" sz="2800" dirty="0" smtClean="0"/>
+              <a:t>-</a:t>
+            </a:r>
+          </a:p>
+          <a:p>
+            <a:pPr>
+              <a:lnSpc>
+                <a:spcPct val="150000"/>
+              </a:lnSpc>
+              <a:tabLst>
+                <a:tab pos="2333625" algn="l"/>
+              </a:tabLst>
+            </a:pPr>
+            <a:r>
+              <a:rPr lang="de-DE" sz="2800" b="1" dirty="0" smtClean="0">
+                <a:solidFill>
+                  <a:schemeClr val="accent1"/>
+                </a:solidFill>
+              </a:rPr>
+              <a:t>Ergebnis:	</a:t>
+            </a:r>
+            <a:r>
+              <a:rPr lang="de-DE" sz="2800" dirty="0" smtClean="0"/>
+              <a:t>Zeitpräferenzen für einen Dozenten</a:t>
+            </a:r>
+          </a:p>
+          <a:p>
+            <a:pPr>
+              <a:lnSpc>
+                <a:spcPct val="150000"/>
+              </a:lnSpc>
+              <a:tabLst>
+                <a:tab pos="2333625" algn="l"/>
+              </a:tabLst>
+            </a:pPr>
+            <a:r>
+              <a:rPr lang="de-DE" sz="2800" dirty="0"/>
+              <a:t>	</a:t>
+            </a:r>
+            <a:r>
+              <a:rPr lang="de-DE" sz="2800" dirty="0" smtClean="0"/>
+              <a:t>wurden aufgenommen</a:t>
+            </a:r>
+            <a:endParaRPr lang="de-DE" sz="2800" dirty="0" smtClean="0"/>
+          </a:p>
+        </p:txBody>
+      </p:sp>
     </p:spTree>
     <p:extLst>
       <p:ext uri="{BB962C8B-B14F-4D97-AF65-F5344CB8AC3E}">
-        <p14:creationId xmlns:p14="http://schemas.microsoft.com/office/powerpoint/2010/main" val="3757027305"/>
+        <p14:creationId xmlns:p14="http://schemas.microsoft.com/office/powerpoint/2010/main" val="1888292561"/>
       </p:ext>
     </p:extLst>
   </p:cSld>
@@ -6011,15 +6450,7 @@
                   <a:schemeClr val="bg1"/>
                 </a:solidFill>
               </a:rPr>
-              <a:t>  </a:t>
-            </a:r>
-            <a:r>
-              <a:rPr lang="de-DE" sz="2800" dirty="0" smtClean="0">
-                <a:solidFill>
-                  <a:schemeClr val="bg1"/>
-                </a:solidFill>
-              </a:rPr>
-              <a:t>Projektteam</a:t>
+              <a:t>  Projektteam</a:t>
             </a:r>
             <a:endParaRPr lang="de-DE" sz="2800" dirty="0">
               <a:solidFill>
@@ -6331,9 +6762,9 @@
       </p:pic>
       <p:pic>
         <p:nvPicPr>
-          <p:cNvPr id="6" name="Picture 2" descr="Bild in Originalgröße anzeigen"/>
+          <p:cNvPr id="3" name="Grafik 2"/>
           <p:cNvPicPr>
-            <a:picLocks noChangeAspect="1" noChangeArrowheads="1"/>
+            <a:picLocks noChangeAspect="1"/>
           </p:cNvPicPr>
           <p:nvPr/>
         </p:nvPicPr>
@@ -6345,29 +6776,18 @@
               </a:ext>
             </a:extLst>
           </a:blip>
-          <a:srcRect/>
           <a:stretch>
             <a:fillRect/>
           </a:stretch>
         </p:blipFill>
-        <p:spPr bwMode="auto">
+        <p:spPr>
           <a:xfrm>
-            <a:off x="7072411" y="4365104"/>
-            <a:ext cx="864096" cy="864096"/>
+            <a:off x="7072411" y="4221087"/>
+            <a:ext cx="715980" cy="1004779"/>
           </a:xfrm>
           <a:prstGeom prst="rect">
             <a:avLst/>
           </a:prstGeom>
-          <a:noFill/>
-          <a:extLst>
-            <a:ext uri="{909E8E84-426E-40DD-AFC4-6F175D3DCCD1}">
-              <a14:hiddenFill xmlns:a14="http://schemas.microsoft.com/office/drawing/2010/main">
-                <a:solidFill>
-                  <a:srgbClr val="FFFFFF"/>
-                </a:solidFill>
-              </a14:hiddenFill>
-            </a:ext>
-          </a:extLst>
         </p:spPr>
       </p:pic>
     </p:spTree>
@@ -6383,177 +6803,7 @@
   <p:timing>
     <p:tnLst>
       <p:par>
-        <p:cTn id="1" dur="indefinite" restart="never" nodeType="tmRoot">
-          <p:childTnLst>
-            <p:seq concurrent="1" nextAc="seek">
-              <p:cTn id="2" dur="indefinite" nodeType="mainSeq">
-                <p:childTnLst>
-                  <p:par>
-                    <p:cTn id="3" fill="hold">
-                      <p:stCondLst>
-                        <p:cond delay="indefinite"/>
-                        <p:cond evt="onBegin" delay="0">
-                          <p:tn val="2"/>
-                        </p:cond>
-                      </p:stCondLst>
-                      <p:childTnLst>
-                        <p:par>
-                          <p:cTn id="4" fill="hold">
-                            <p:stCondLst>
-                              <p:cond delay="0"/>
-                            </p:stCondLst>
-                            <p:childTnLst>
-                              <p:par>
-                                <p:cTn id="5" presetID="1" presetClass="entr" presetSubtype="0" fill="hold" nodeType="withEffect">
-                                  <p:stCondLst>
-                                    <p:cond delay="0"/>
-                                  </p:stCondLst>
-                                  <p:childTnLst>
-                                    <p:set>
-                                      <p:cBhvr>
-                                        <p:cTn id="6" dur="1" fill="hold">
-                                          <p:stCondLst>
-                                            <p:cond delay="0"/>
-                                          </p:stCondLst>
-                                        </p:cTn>
-                                        <p:tgtEl>
-                                          <p:spTgt spid="4"/>
-                                        </p:tgtEl>
-                                        <p:attrNameLst>
-                                          <p:attrName>style.visibility</p:attrName>
-                                        </p:attrNameLst>
-                                      </p:cBhvr>
-                                      <p:to>
-                                        <p:strVal val="visible"/>
-                                      </p:to>
-                                    </p:set>
-                                  </p:childTnLst>
-                                </p:cTn>
-                              </p:par>
-                            </p:childTnLst>
-                          </p:cTn>
-                        </p:par>
-                      </p:childTnLst>
-                    </p:cTn>
-                  </p:par>
-                  <p:par>
-                    <p:cTn id="7" fill="hold">
-                      <p:stCondLst>
-                        <p:cond delay="indefinite"/>
-                      </p:stCondLst>
-                      <p:childTnLst>
-                        <p:par>
-                          <p:cTn id="8" fill="hold">
-                            <p:stCondLst>
-                              <p:cond delay="0"/>
-                            </p:stCondLst>
-                            <p:childTnLst>
-                              <p:par>
-                                <p:cTn id="9" presetID="1" presetClass="entr" presetSubtype="0" fill="hold" nodeType="clickEffect">
-                                  <p:stCondLst>
-                                    <p:cond delay="0"/>
-                                  </p:stCondLst>
-                                  <p:childTnLst>
-                                    <p:set>
-                                      <p:cBhvr>
-                                        <p:cTn id="10" dur="1" fill="hold">
-                                          <p:stCondLst>
-                                            <p:cond delay="0"/>
-                                          </p:stCondLst>
-                                        </p:cTn>
-                                        <p:tgtEl>
-                                          <p:spTgt spid="7"/>
-                                        </p:tgtEl>
-                                        <p:attrNameLst>
-                                          <p:attrName>style.visibility</p:attrName>
-                                        </p:attrNameLst>
-                                      </p:cBhvr>
-                                      <p:to>
-                                        <p:strVal val="visible"/>
-                                      </p:to>
-                                    </p:set>
-                                  </p:childTnLst>
-                                </p:cTn>
-                              </p:par>
-                              <p:par>
-                                <p:cTn id="11" presetID="1" presetClass="entr" presetSubtype="0" fill="hold" nodeType="withEffect">
-                                  <p:stCondLst>
-                                    <p:cond delay="0"/>
-                                  </p:stCondLst>
-                                  <p:childTnLst>
-                                    <p:set>
-                                      <p:cBhvr>
-                                        <p:cTn id="12" dur="1" fill="hold">
-                                          <p:stCondLst>
-                                            <p:cond delay="0"/>
-                                          </p:stCondLst>
-                                        </p:cTn>
-                                        <p:tgtEl>
-                                          <p:spTgt spid="8"/>
-                                        </p:tgtEl>
-                                        <p:attrNameLst>
-                                          <p:attrName>style.visibility</p:attrName>
-                                        </p:attrNameLst>
-                                      </p:cBhvr>
-                                      <p:to>
-                                        <p:strVal val="visible"/>
-                                      </p:to>
-                                    </p:set>
-                                  </p:childTnLst>
-                                </p:cTn>
-                              </p:par>
-                              <p:par>
-                                <p:cTn id="13" presetID="1" presetClass="entr" presetSubtype="0" fill="hold" nodeType="withEffect">
-                                  <p:stCondLst>
-                                    <p:cond delay="0"/>
-                                  </p:stCondLst>
-                                  <p:childTnLst>
-                                    <p:set>
-                                      <p:cBhvr>
-                                        <p:cTn id="14" dur="1" fill="hold">
-                                          <p:stCondLst>
-                                            <p:cond delay="0"/>
-                                          </p:stCondLst>
-                                        </p:cTn>
-                                        <p:tgtEl>
-                                          <p:spTgt spid="9"/>
-                                        </p:tgtEl>
-                                        <p:attrNameLst>
-                                          <p:attrName>style.visibility</p:attrName>
-                                        </p:attrNameLst>
-                                      </p:cBhvr>
-                                      <p:to>
-                                        <p:strVal val="visible"/>
-                                      </p:to>
-                                    </p:set>
-                                  </p:childTnLst>
-                                </p:cTn>
-                              </p:par>
-                            </p:childTnLst>
-                          </p:cTn>
-                        </p:par>
-                      </p:childTnLst>
-                    </p:cTn>
-                  </p:par>
-                </p:childTnLst>
-              </p:cTn>
-              <p:prevCondLst>
-                <p:cond evt="onPrev" delay="0">
-                  <p:tgtEl>
-                    <p:sldTgt/>
-                  </p:tgtEl>
-                </p:cond>
-              </p:prevCondLst>
-              <p:nextCondLst>
-                <p:cond evt="onNext" delay="0">
-                  <p:tgtEl>
-                    <p:sldTgt/>
-                  </p:tgtEl>
-                </p:cond>
-              </p:nextCondLst>
-            </p:seq>
-          </p:childTnLst>
-        </p:cTn>
+        <p:cTn id="1" dur="indefinite" restart="never" nodeType="tmRoot"/>
       </p:par>
     </p:tnLst>
   </p:timing>
@@ -6660,15 +6910,1060 @@
                   <a:schemeClr val="bg1"/>
                 </a:solidFill>
               </a:rPr>
-              <a:t>  </a:t>
-            </a:r>
+              <a:t>  Fachlicher Überblick - Geschäftsanwendungsfälle</a:t>
+            </a:r>
+            <a:endParaRPr lang="de-DE" sz="2800" dirty="0">
+              <a:solidFill>
+                <a:schemeClr val="bg1"/>
+              </a:solidFill>
+            </a:endParaRPr>
+          </a:p>
+        </p:txBody>
+      </p:sp>
+      <p:sp>
+        <p:nvSpPr>
+          <p:cNvPr id="4" name="Textfeld 3"/>
+          <p:cNvSpPr txBox="1"/>
+          <p:nvPr/>
+        </p:nvSpPr>
+        <p:spPr>
+          <a:xfrm>
+            <a:off x="385638" y="836712"/>
+            <a:ext cx="8506841" cy="5355312"/>
+          </a:xfrm>
+          <a:prstGeom prst="rect">
+            <a:avLst/>
+          </a:prstGeom>
+          <a:noFill/>
+        </p:spPr>
+        <p:txBody>
+          <a:bodyPr wrap="square" rtlCol="0">
+            <a:spAutoFit/>
+          </a:bodyPr>
+          <a:lstStyle/>
+          <a:p>
+            <a:pPr>
+              <a:lnSpc>
+                <a:spcPct val="150000"/>
+              </a:lnSpc>
+              <a:tabLst>
+                <a:tab pos="2333625" algn="l"/>
+              </a:tabLst>
+            </a:pPr>
+            <a:r>
+              <a:rPr lang="de-DE" sz="3200" b="1" dirty="0" smtClean="0">
+                <a:solidFill>
+                  <a:schemeClr val="accent1"/>
+                </a:solidFill>
+              </a:rPr>
+              <a:t>BUC3: Stundeplan anzeigen</a:t>
+            </a:r>
+          </a:p>
+          <a:p>
+            <a:pPr>
+              <a:lnSpc>
+                <a:spcPct val="150000"/>
+              </a:lnSpc>
+              <a:tabLst>
+                <a:tab pos="2333625" algn="l"/>
+              </a:tabLst>
+            </a:pPr>
+            <a:r>
+              <a:rPr lang="de-DE" sz="2800" b="1" dirty="0" smtClean="0">
+                <a:solidFill>
+                  <a:schemeClr val="accent1"/>
+                </a:solidFill>
+              </a:rPr>
+              <a:t>Auslöser: 	</a:t>
+            </a:r>
+            <a:r>
+              <a:rPr lang="de-DE" sz="2800" dirty="0" smtClean="0"/>
+              <a:t>Start Funktion Stundenplan anzeigen</a:t>
+            </a:r>
+            <a:endParaRPr lang="de-DE" sz="2800" b="1" dirty="0" smtClean="0">
+              <a:solidFill>
+                <a:schemeClr val="accent1"/>
+              </a:solidFill>
+            </a:endParaRPr>
+          </a:p>
+          <a:p>
+            <a:pPr>
+              <a:lnSpc>
+                <a:spcPct val="150000"/>
+              </a:lnSpc>
+              <a:tabLst>
+                <a:tab pos="2333625" algn="l"/>
+              </a:tabLst>
+            </a:pPr>
+            <a:r>
+              <a:rPr lang="de-DE" sz="2800" b="1" dirty="0" smtClean="0">
+                <a:solidFill>
+                  <a:schemeClr val="accent1"/>
+                </a:solidFill>
+              </a:rPr>
+              <a:t>Vorbedingung: 	</a:t>
+            </a:r>
+            <a:r>
+              <a:rPr lang="de-DE" sz="2800" dirty="0" smtClean="0"/>
+              <a:t>Mindestens eine Stundenplan-Planung</a:t>
+            </a:r>
+          </a:p>
+          <a:p>
+            <a:pPr>
+              <a:lnSpc>
+                <a:spcPct val="150000"/>
+              </a:lnSpc>
+              <a:tabLst>
+                <a:tab pos="2333625" algn="l"/>
+              </a:tabLst>
+            </a:pPr>
+            <a:r>
+              <a:rPr lang="de-DE" sz="2800" dirty="0"/>
+              <a:t>	</a:t>
+            </a:r>
+            <a:r>
+              <a:rPr lang="de-DE" sz="2800" dirty="0" smtClean="0"/>
+              <a:t>wurde durchgeführt</a:t>
+            </a:r>
+            <a:endParaRPr lang="de-DE" sz="2800" dirty="0" smtClean="0"/>
+          </a:p>
+          <a:p>
+            <a:pPr>
+              <a:lnSpc>
+                <a:spcPct val="150000"/>
+              </a:lnSpc>
+              <a:tabLst>
+                <a:tab pos="2333625" algn="l"/>
+              </a:tabLst>
+            </a:pPr>
+            <a:r>
+              <a:rPr lang="de-DE" sz="2800" b="1" dirty="0" smtClean="0">
+                <a:solidFill>
+                  <a:schemeClr val="accent1"/>
+                </a:solidFill>
+              </a:rPr>
+              <a:t>Stakeholder:	</a:t>
+            </a:r>
+            <a:r>
+              <a:rPr lang="de-DE" sz="2800" dirty="0" smtClean="0"/>
+              <a:t>Mitarbeiter Verwaltung</a:t>
+            </a:r>
+          </a:p>
+          <a:p>
+            <a:pPr>
+              <a:lnSpc>
+                <a:spcPct val="150000"/>
+              </a:lnSpc>
+              <a:tabLst>
+                <a:tab pos="2333625" algn="l"/>
+              </a:tabLst>
+            </a:pPr>
+            <a:r>
+              <a:rPr lang="de-DE" sz="2800" b="1" dirty="0" smtClean="0">
+                <a:solidFill>
+                  <a:schemeClr val="accent1"/>
+                </a:solidFill>
+              </a:rPr>
+              <a:t>Output:	</a:t>
+            </a:r>
+            <a:r>
+              <a:rPr lang="de-DE" sz="2800" dirty="0" smtClean="0"/>
+              <a:t>Stundenplan eines Studiengangs</a:t>
+            </a:r>
+          </a:p>
+          <a:p>
+            <a:pPr>
+              <a:lnSpc>
+                <a:spcPct val="150000"/>
+              </a:lnSpc>
+              <a:tabLst>
+                <a:tab pos="2333625" algn="l"/>
+              </a:tabLst>
+            </a:pPr>
+            <a:r>
+              <a:rPr lang="de-DE" sz="2800" b="1" dirty="0" smtClean="0">
+                <a:solidFill>
+                  <a:schemeClr val="accent1"/>
+                </a:solidFill>
+              </a:rPr>
+              <a:t>Ergebnis:	</a:t>
+            </a:r>
+            <a:r>
+              <a:rPr lang="de-DE" sz="2800" dirty="0" smtClean="0"/>
+              <a:t>Die aktuelle Stundenplan-Planung wird</a:t>
+            </a:r>
+          </a:p>
+          <a:p>
+            <a:pPr>
+              <a:lnSpc>
+                <a:spcPct val="150000"/>
+              </a:lnSpc>
+              <a:tabLst>
+                <a:tab pos="2333625" algn="l"/>
+              </a:tabLst>
+            </a:pPr>
+            <a:r>
+              <a:rPr lang="de-DE" sz="2800" dirty="0"/>
+              <a:t>	</a:t>
+            </a:r>
+            <a:r>
+              <a:rPr lang="de-DE" sz="2800" dirty="0" smtClean="0"/>
+              <a:t>auf dem Bildschirm angezeigt</a:t>
+            </a:r>
+            <a:endParaRPr lang="de-DE" sz="2800" dirty="0" smtClean="0"/>
+          </a:p>
+        </p:txBody>
+      </p:sp>
+    </p:spTree>
+    <p:extLst>
+      <p:ext uri="{BB962C8B-B14F-4D97-AF65-F5344CB8AC3E}">
+        <p14:creationId xmlns:p14="http://schemas.microsoft.com/office/powerpoint/2010/main" val="4049714968"/>
+      </p:ext>
+    </p:extLst>
+  </p:cSld>
+  <p:clrMapOvr>
+    <a:masterClrMapping/>
+  </p:clrMapOvr>
+  <p:timing>
+    <p:tnLst>
+      <p:par>
+        <p:cTn id="1" dur="indefinite" restart="never" nodeType="tmRoot"/>
+      </p:par>
+    </p:tnLst>
+  </p:timing>
+</p:sld>
+</file>
+
+<file path=ppt/slides/slide21.xml><?xml version="1.0" encoding="utf-8"?>
+<p:sld xmlns:a="http://schemas.openxmlformats.org/drawingml/2006/main" xmlns:r="http://schemas.openxmlformats.org/officeDocument/2006/relationships" xmlns:p="http://schemas.openxmlformats.org/presentationml/2006/main">
+  <p:cSld>
+    <p:spTree>
+      <p:nvGrpSpPr>
+        <p:cNvPr id="1" name=""/>
+        <p:cNvGrpSpPr/>
+        <p:nvPr/>
+      </p:nvGrpSpPr>
+      <p:grpSpPr>
+        <a:xfrm>
+          <a:off x="0" y="0"/>
+          <a:ext cx="0" cy="0"/>
+          <a:chOff x="0" y="0"/>
+          <a:chExt cx="0" cy="0"/>
+        </a:xfrm>
+      </p:grpSpPr>
+      <p:pic>
+        <p:nvPicPr>
+          <p:cNvPr id="3074" name="Picture 2"/>
+          <p:cNvPicPr>
+            <a:picLocks noChangeAspect="1" noChangeArrowheads="1"/>
+          </p:cNvPicPr>
+          <p:nvPr/>
+        </p:nvPicPr>
+        <p:blipFill>
+          <a:blip r:embed="rId2">
+            <a:extLst>
+              <a:ext uri="{28A0092B-C50C-407E-A947-70E740481C1C}">
+                <a14:useLocalDpi xmlns:a14="http://schemas.microsoft.com/office/drawing/2010/main" val="0"/>
+              </a:ext>
+            </a:extLst>
+          </a:blip>
+          <a:srcRect/>
+          <a:stretch>
+            <a:fillRect/>
+          </a:stretch>
+        </p:blipFill>
+        <p:spPr bwMode="auto">
+          <a:xfrm>
+            <a:off x="1" y="1"/>
+            <a:ext cx="9144000" cy="764703"/>
+          </a:xfrm>
+          <a:prstGeom prst="rect">
+            <a:avLst/>
+          </a:prstGeom>
+          <a:noFill/>
+          <a:ln>
+            <a:noFill/>
+          </a:ln>
+          <a:extLst>
+            <a:ext uri="{909E8E84-426E-40DD-AFC4-6F175D3DCCD1}">
+              <a14:hiddenFill xmlns:a14="http://schemas.microsoft.com/office/drawing/2010/main">
+                <a:solidFill>
+                  <a:schemeClr val="accent1"/>
+                </a:solidFill>
+              </a14:hiddenFill>
+            </a:ext>
+            <a:ext uri="{91240B29-F687-4F45-9708-019B960494DF}">
+              <a14:hiddenLine xmlns:a14="http://schemas.microsoft.com/office/drawing/2010/main" w="9525">
+                <a:solidFill>
+                  <a:schemeClr val="tx1"/>
+                </a:solidFill>
+                <a:miter lim="800000"/>
+                <a:headEnd/>
+                <a:tailEnd/>
+              </a14:hiddenLine>
+            </a:ext>
+          </a:extLst>
+        </p:spPr>
+      </p:pic>
+      <p:sp>
+        <p:nvSpPr>
+          <p:cNvPr id="2" name="Titel 1"/>
+          <p:cNvSpPr>
+            <a:spLocks noGrp="1"/>
+          </p:cNvSpPr>
+          <p:nvPr>
+            <p:ph type="title"/>
+          </p:nvPr>
+        </p:nvSpPr>
+        <p:spPr>
+          <a:xfrm>
+            <a:off x="32973" y="0"/>
+            <a:ext cx="8229600" cy="908720"/>
+          </a:xfrm>
+        </p:spPr>
+        <p:txBody>
+          <a:bodyPr>
+            <a:normAutofit/>
+          </a:bodyPr>
+          <a:lstStyle/>
+          <a:p>
+            <a:pPr algn="l"/>
             <a:r>
               <a:rPr lang="de-DE" sz="2800" dirty="0" smtClean="0">
                 <a:solidFill>
                   <a:schemeClr val="bg1"/>
                 </a:solidFill>
               </a:rPr>
-              <a:t>Überblick technische Architektur</a:t>
+              <a:t>  Fachlicher Überblick - </a:t>
+            </a:r>
+            <a:r>
+              <a:rPr lang="de-DE" sz="2800" dirty="0" smtClean="0">
+                <a:solidFill>
+                  <a:schemeClr val="bg1"/>
+                </a:solidFill>
+              </a:rPr>
+              <a:t>Anforderungen</a:t>
+            </a:r>
+            <a:endParaRPr lang="de-DE" sz="2800" dirty="0">
+              <a:solidFill>
+                <a:schemeClr val="bg1"/>
+              </a:solidFill>
+            </a:endParaRPr>
+          </a:p>
+        </p:txBody>
+      </p:sp>
+      <p:sp>
+        <p:nvSpPr>
+          <p:cNvPr id="4" name="Textfeld 3"/>
+          <p:cNvSpPr txBox="1"/>
+          <p:nvPr/>
+        </p:nvSpPr>
+        <p:spPr>
+          <a:xfrm>
+            <a:off x="385638" y="836712"/>
+            <a:ext cx="8506841" cy="6232475"/>
+          </a:xfrm>
+          <a:prstGeom prst="rect">
+            <a:avLst/>
+          </a:prstGeom>
+          <a:noFill/>
+        </p:spPr>
+        <p:txBody>
+          <a:bodyPr wrap="square" rtlCol="0">
+            <a:spAutoFit/>
+          </a:bodyPr>
+          <a:lstStyle/>
+          <a:p>
+            <a:pPr>
+              <a:lnSpc>
+                <a:spcPct val="150000"/>
+              </a:lnSpc>
+              <a:tabLst>
+                <a:tab pos="2333625" algn="l"/>
+              </a:tabLst>
+            </a:pPr>
+            <a:r>
+              <a:rPr lang="de-DE" sz="2800" b="1" dirty="0" smtClean="0">
+                <a:solidFill>
+                  <a:schemeClr val="accent1"/>
+                </a:solidFill>
+              </a:rPr>
+              <a:t>Funktionale Anforderungen (Auszug)</a:t>
+            </a:r>
+          </a:p>
+          <a:p>
+            <a:pPr marL="457200" indent="-457200">
+              <a:buFont typeface="Arial" panose="020B0604020202020204" pitchFamily="34" charset="0"/>
+              <a:buChar char="•"/>
+              <a:tabLst>
+                <a:tab pos="2333625" algn="l"/>
+              </a:tabLst>
+            </a:pPr>
+            <a:r>
+              <a:rPr lang="de-DE" sz="2800" dirty="0"/>
+              <a:t>Das System muss das mathematische </a:t>
+            </a:r>
+            <a:r>
+              <a:rPr lang="de-DE" sz="2800" dirty="0" smtClean="0"/>
+              <a:t>Zuordnungs-problem </a:t>
+            </a:r>
+            <a:r>
+              <a:rPr lang="de-DE" sz="2800" dirty="0"/>
+              <a:t>der vorhandenen Informationen (Raum, Veranstaltung, Dozent inklusive Zeitpräferenz) mit Hilfe eines </a:t>
+            </a:r>
+            <a:r>
+              <a:rPr lang="de-DE" sz="2800" dirty="0" smtClean="0"/>
+              <a:t>Algorithmus </a:t>
+            </a:r>
+            <a:r>
+              <a:rPr lang="de-DE" sz="2800" dirty="0"/>
+              <a:t>automatisch berechnen</a:t>
+            </a:r>
+            <a:r>
+              <a:rPr lang="de-DE" sz="2800" dirty="0" smtClean="0"/>
+              <a:t>.</a:t>
+            </a:r>
+          </a:p>
+          <a:p>
+            <a:pPr marL="457200" indent="-457200">
+              <a:buFont typeface="Arial" panose="020B0604020202020204" pitchFamily="34" charset="0"/>
+              <a:buChar char="•"/>
+              <a:tabLst>
+                <a:tab pos="2333625" algn="l"/>
+              </a:tabLst>
+            </a:pPr>
+            <a:endParaRPr lang="de-DE" sz="1200" dirty="0" smtClean="0"/>
+          </a:p>
+          <a:p>
+            <a:pPr marL="457200" indent="-457200">
+              <a:buFont typeface="Arial" panose="020B0604020202020204" pitchFamily="34" charset="0"/>
+              <a:buChar char="•"/>
+              <a:tabLst>
+                <a:tab pos="2333625" algn="l"/>
+              </a:tabLst>
+            </a:pPr>
+            <a:r>
+              <a:rPr lang="de-DE" sz="2800" dirty="0"/>
+              <a:t>Das System kann dem Benutzer die Möglichkeit bieten die Zeitpräferenzen eines Dozenten über vordefinierte Zeitblöcke (Wochenarbeitsstunden) zu erfassen und speichern</a:t>
+            </a:r>
+            <a:r>
+              <a:rPr lang="de-DE" sz="2800" dirty="0" smtClean="0"/>
+              <a:t>.</a:t>
+            </a:r>
+          </a:p>
+          <a:p>
+            <a:pPr marL="457200" indent="-457200">
+              <a:buFont typeface="Arial" panose="020B0604020202020204" pitchFamily="34" charset="0"/>
+              <a:buChar char="•"/>
+              <a:tabLst>
+                <a:tab pos="2333625" algn="l"/>
+              </a:tabLst>
+            </a:pPr>
+            <a:endParaRPr lang="de-DE" sz="1200" dirty="0" smtClean="0"/>
+          </a:p>
+          <a:p>
+            <a:pPr marL="457200" indent="-457200">
+              <a:buFont typeface="Arial" panose="020B0604020202020204" pitchFamily="34" charset="0"/>
+              <a:buChar char="•"/>
+              <a:tabLst>
+                <a:tab pos="2333625" algn="l"/>
+              </a:tabLst>
+            </a:pPr>
+            <a:r>
+              <a:rPr lang="de-DE" sz="2800" dirty="0"/>
+              <a:t>Das System sollte dem Benutzer die Möglichkeit bieten bereits erfasste Zeitpräferenzen eines Dozenten anzeigen und bearbeiten zu können.</a:t>
+            </a:r>
+            <a:endParaRPr lang="de-DE" sz="2800" dirty="0" smtClean="0"/>
+          </a:p>
+          <a:p>
+            <a:pPr marL="457200" indent="-457200">
+              <a:buFont typeface="Arial" panose="020B0604020202020204" pitchFamily="34" charset="0"/>
+              <a:buChar char="•"/>
+              <a:tabLst>
+                <a:tab pos="2333625" algn="l"/>
+              </a:tabLst>
+            </a:pPr>
+            <a:endParaRPr lang="de-DE" sz="2500" dirty="0" smtClean="0"/>
+          </a:p>
+        </p:txBody>
+      </p:sp>
+    </p:spTree>
+    <p:extLst>
+      <p:ext uri="{BB962C8B-B14F-4D97-AF65-F5344CB8AC3E}">
+        <p14:creationId xmlns:p14="http://schemas.microsoft.com/office/powerpoint/2010/main" val="245530455"/>
+      </p:ext>
+    </p:extLst>
+  </p:cSld>
+  <p:clrMapOvr>
+    <a:masterClrMapping/>
+  </p:clrMapOvr>
+  <p:timing>
+    <p:tnLst>
+      <p:par>
+        <p:cTn id="1" dur="indefinite" restart="never" nodeType="tmRoot"/>
+      </p:par>
+    </p:tnLst>
+  </p:timing>
+</p:sld>
+</file>
+
+<file path=ppt/slides/slide22.xml><?xml version="1.0" encoding="utf-8"?>
+<p:sld xmlns:a="http://schemas.openxmlformats.org/drawingml/2006/main" xmlns:r="http://schemas.openxmlformats.org/officeDocument/2006/relationships" xmlns:p="http://schemas.openxmlformats.org/presentationml/2006/main">
+  <p:cSld>
+    <p:spTree>
+      <p:nvGrpSpPr>
+        <p:cNvPr id="1" name=""/>
+        <p:cNvGrpSpPr/>
+        <p:nvPr/>
+      </p:nvGrpSpPr>
+      <p:grpSpPr>
+        <a:xfrm>
+          <a:off x="0" y="0"/>
+          <a:ext cx="0" cy="0"/>
+          <a:chOff x="0" y="0"/>
+          <a:chExt cx="0" cy="0"/>
+        </a:xfrm>
+      </p:grpSpPr>
+      <p:pic>
+        <p:nvPicPr>
+          <p:cNvPr id="3074" name="Picture 2"/>
+          <p:cNvPicPr>
+            <a:picLocks noChangeAspect="1" noChangeArrowheads="1"/>
+          </p:cNvPicPr>
+          <p:nvPr/>
+        </p:nvPicPr>
+        <p:blipFill>
+          <a:blip r:embed="rId2">
+            <a:extLst>
+              <a:ext uri="{28A0092B-C50C-407E-A947-70E740481C1C}">
+                <a14:useLocalDpi xmlns:a14="http://schemas.microsoft.com/office/drawing/2010/main" val="0"/>
+              </a:ext>
+            </a:extLst>
+          </a:blip>
+          <a:srcRect/>
+          <a:stretch>
+            <a:fillRect/>
+          </a:stretch>
+        </p:blipFill>
+        <p:spPr bwMode="auto">
+          <a:xfrm>
+            <a:off x="1" y="1"/>
+            <a:ext cx="9144000" cy="764703"/>
+          </a:xfrm>
+          <a:prstGeom prst="rect">
+            <a:avLst/>
+          </a:prstGeom>
+          <a:noFill/>
+          <a:ln>
+            <a:noFill/>
+          </a:ln>
+          <a:extLst>
+            <a:ext uri="{909E8E84-426E-40DD-AFC4-6F175D3DCCD1}">
+              <a14:hiddenFill xmlns:a14="http://schemas.microsoft.com/office/drawing/2010/main">
+                <a:solidFill>
+                  <a:schemeClr val="accent1"/>
+                </a:solidFill>
+              </a14:hiddenFill>
+            </a:ext>
+            <a:ext uri="{91240B29-F687-4F45-9708-019B960494DF}">
+              <a14:hiddenLine xmlns:a14="http://schemas.microsoft.com/office/drawing/2010/main" w="9525">
+                <a:solidFill>
+                  <a:schemeClr val="tx1"/>
+                </a:solidFill>
+                <a:miter lim="800000"/>
+                <a:headEnd/>
+                <a:tailEnd/>
+              </a14:hiddenLine>
+            </a:ext>
+          </a:extLst>
+        </p:spPr>
+      </p:pic>
+      <p:sp>
+        <p:nvSpPr>
+          <p:cNvPr id="2" name="Titel 1"/>
+          <p:cNvSpPr>
+            <a:spLocks noGrp="1"/>
+          </p:cNvSpPr>
+          <p:nvPr>
+            <p:ph type="title"/>
+          </p:nvPr>
+        </p:nvSpPr>
+        <p:spPr>
+          <a:xfrm>
+            <a:off x="32973" y="0"/>
+            <a:ext cx="8229600" cy="908720"/>
+          </a:xfrm>
+        </p:spPr>
+        <p:txBody>
+          <a:bodyPr>
+            <a:normAutofit/>
+          </a:bodyPr>
+          <a:lstStyle/>
+          <a:p>
+            <a:pPr algn="l"/>
+            <a:r>
+              <a:rPr lang="de-DE" sz="2800" dirty="0" smtClean="0">
+                <a:solidFill>
+                  <a:schemeClr val="bg1"/>
+                </a:solidFill>
+              </a:rPr>
+              <a:t>  Fachlicher Überblick - </a:t>
+            </a:r>
+            <a:r>
+              <a:rPr lang="de-DE" sz="2800" dirty="0" smtClean="0">
+                <a:solidFill>
+                  <a:schemeClr val="bg1"/>
+                </a:solidFill>
+              </a:rPr>
+              <a:t>Anforderungen</a:t>
+            </a:r>
+            <a:endParaRPr lang="de-DE" sz="2800" dirty="0">
+              <a:solidFill>
+                <a:schemeClr val="bg1"/>
+              </a:solidFill>
+            </a:endParaRPr>
+          </a:p>
+        </p:txBody>
+      </p:sp>
+      <p:sp>
+        <p:nvSpPr>
+          <p:cNvPr id="4" name="Textfeld 3"/>
+          <p:cNvSpPr txBox="1"/>
+          <p:nvPr/>
+        </p:nvSpPr>
+        <p:spPr>
+          <a:xfrm>
+            <a:off x="385638" y="836712"/>
+            <a:ext cx="8506841" cy="6032421"/>
+          </a:xfrm>
+          <a:prstGeom prst="rect">
+            <a:avLst/>
+          </a:prstGeom>
+          <a:noFill/>
+        </p:spPr>
+        <p:txBody>
+          <a:bodyPr wrap="square" rtlCol="0">
+            <a:spAutoFit/>
+          </a:bodyPr>
+          <a:lstStyle/>
+          <a:p>
+            <a:pPr>
+              <a:lnSpc>
+                <a:spcPct val="150000"/>
+              </a:lnSpc>
+              <a:tabLst>
+                <a:tab pos="2333625" algn="l"/>
+              </a:tabLst>
+            </a:pPr>
+            <a:r>
+              <a:rPr lang="de-DE" sz="2800" b="1" dirty="0" smtClean="0">
+                <a:solidFill>
+                  <a:schemeClr val="accent1"/>
+                </a:solidFill>
+              </a:rPr>
+              <a:t>Nicht-Funktionale Anforderungen (Auszug)</a:t>
+            </a:r>
+            <a:endParaRPr lang="de-DE" sz="2800" b="1" dirty="0" smtClean="0"/>
+          </a:p>
+          <a:p>
+            <a:pPr marL="514350" indent="-514350">
+              <a:buFont typeface="Arial" panose="020B0604020202020204" pitchFamily="34" charset="0"/>
+              <a:buChar char="•"/>
+              <a:tabLst>
+                <a:tab pos="2333625" algn="l"/>
+              </a:tabLst>
+            </a:pPr>
+            <a:r>
+              <a:rPr lang="de-DE" sz="2800" dirty="0" smtClean="0"/>
+              <a:t>Alle Daten werden in rel</a:t>
+            </a:r>
+            <a:r>
+              <a:rPr lang="de-DE" sz="2800" dirty="0" smtClean="0"/>
+              <a:t>ationaler</a:t>
+            </a:r>
+            <a:r>
+              <a:rPr lang="de-DE" sz="2800" dirty="0" smtClean="0"/>
+              <a:t> DB gespeichert</a:t>
+            </a:r>
+          </a:p>
+          <a:p>
+            <a:pPr marL="514350" indent="-514350">
+              <a:buFont typeface="Arial" panose="020B0604020202020204" pitchFamily="34" charset="0"/>
+              <a:buChar char="•"/>
+              <a:tabLst>
+                <a:tab pos="2333625" algn="l"/>
+              </a:tabLst>
+            </a:pPr>
+            <a:endParaRPr lang="de-DE" sz="1200" dirty="0" smtClean="0"/>
+          </a:p>
+          <a:p>
+            <a:pPr marL="514350" indent="-514350">
+              <a:buFont typeface="Arial" panose="020B0604020202020204" pitchFamily="34" charset="0"/>
+              <a:buChar char="•"/>
+              <a:tabLst>
+                <a:tab pos="2333625" algn="l"/>
+              </a:tabLst>
+            </a:pPr>
+            <a:r>
+              <a:rPr lang="de-DE" sz="2800" dirty="0" smtClean="0"/>
+              <a:t>Das System muss über einen Browser bedient und ausgeführt werden</a:t>
+            </a:r>
+          </a:p>
+          <a:p>
+            <a:pPr marL="514350" indent="-514350">
+              <a:buFont typeface="Arial" panose="020B0604020202020204" pitchFamily="34" charset="0"/>
+              <a:buChar char="•"/>
+              <a:tabLst>
+                <a:tab pos="2333625" algn="l"/>
+              </a:tabLst>
+            </a:pPr>
+            <a:endParaRPr lang="de-DE" sz="1200" dirty="0" smtClean="0"/>
+          </a:p>
+          <a:p>
+            <a:pPr marL="514350" indent="-514350">
+              <a:buFont typeface="Arial" panose="020B0604020202020204" pitchFamily="34" charset="0"/>
+              <a:buChar char="•"/>
+              <a:tabLst>
+                <a:tab pos="2333625" algn="l"/>
+              </a:tabLst>
+            </a:pPr>
+            <a:r>
+              <a:rPr lang="de-DE" sz="2800" dirty="0"/>
+              <a:t>Das System muss dem Benutzer die Möglichkeit bieten jegliche Eingaben über die Tastatur/Maus vorzunehmen.</a:t>
+            </a:r>
+            <a:endParaRPr lang="de-DE" sz="2800" dirty="0" smtClean="0"/>
+          </a:p>
+          <a:p>
+            <a:pPr marL="514350" indent="-514350">
+              <a:buFont typeface="Arial" panose="020B0604020202020204" pitchFamily="34" charset="0"/>
+              <a:buChar char="•"/>
+              <a:tabLst>
+                <a:tab pos="2333625" algn="l"/>
+              </a:tabLst>
+            </a:pPr>
+            <a:endParaRPr lang="de-DE" sz="1200" dirty="0" smtClean="0"/>
+          </a:p>
+          <a:p>
+            <a:pPr marL="514350" indent="-514350">
+              <a:buFont typeface="Arial" panose="020B0604020202020204" pitchFamily="34" charset="0"/>
+              <a:buChar char="•"/>
+              <a:tabLst>
+                <a:tab pos="2333625" algn="l"/>
+              </a:tabLst>
+            </a:pPr>
+            <a:r>
+              <a:rPr lang="de-DE" sz="2800" dirty="0" smtClean="0"/>
+              <a:t>Die </a:t>
+            </a:r>
+            <a:r>
+              <a:rPr lang="de-DE" sz="2800" dirty="0"/>
+              <a:t>Anwendung wird mit mindestens 3 unterschiedlichen und entkoppelten Schichten (Datenhaltung, Applikations-logik und GUI) implementiert. </a:t>
+            </a:r>
+          </a:p>
+          <a:p>
+            <a:pPr marL="514350" indent="-514350">
+              <a:buFont typeface="Arial" panose="020B0604020202020204" pitchFamily="34" charset="0"/>
+              <a:buChar char="•"/>
+              <a:tabLst>
+                <a:tab pos="2333625" algn="l"/>
+              </a:tabLst>
+            </a:pPr>
+            <a:endParaRPr lang="de-DE" sz="2800" dirty="0" smtClean="0"/>
+          </a:p>
+        </p:txBody>
+      </p:sp>
+    </p:spTree>
+    <p:extLst>
+      <p:ext uri="{BB962C8B-B14F-4D97-AF65-F5344CB8AC3E}">
+        <p14:creationId xmlns:p14="http://schemas.microsoft.com/office/powerpoint/2010/main" val="2113876839"/>
+      </p:ext>
+    </p:extLst>
+  </p:cSld>
+  <p:clrMapOvr>
+    <a:masterClrMapping/>
+  </p:clrMapOvr>
+  <p:timing>
+    <p:tnLst>
+      <p:par>
+        <p:cTn id="1" dur="indefinite" restart="never" nodeType="tmRoot"/>
+      </p:par>
+    </p:tnLst>
+  </p:timing>
+</p:sld>
+</file>
+
+<file path=ppt/slides/slide23.xml><?xml version="1.0" encoding="utf-8"?>
+<p:sld xmlns:a="http://schemas.openxmlformats.org/drawingml/2006/main" xmlns:r="http://schemas.openxmlformats.org/officeDocument/2006/relationships" xmlns:p="http://schemas.openxmlformats.org/presentationml/2006/main">
+  <p:cSld>
+    <p:spTree>
+      <p:nvGrpSpPr>
+        <p:cNvPr id="1" name=""/>
+        <p:cNvGrpSpPr/>
+        <p:nvPr/>
+      </p:nvGrpSpPr>
+      <p:grpSpPr>
+        <a:xfrm>
+          <a:off x="0" y="0"/>
+          <a:ext cx="0" cy="0"/>
+          <a:chOff x="0" y="0"/>
+          <a:chExt cx="0" cy="0"/>
+        </a:xfrm>
+      </p:grpSpPr>
+      <p:pic>
+        <p:nvPicPr>
+          <p:cNvPr id="3074" name="Picture 2"/>
+          <p:cNvPicPr>
+            <a:picLocks noChangeAspect="1" noChangeArrowheads="1"/>
+          </p:cNvPicPr>
+          <p:nvPr/>
+        </p:nvPicPr>
+        <p:blipFill>
+          <a:blip r:embed="rId2">
+            <a:extLst>
+              <a:ext uri="{28A0092B-C50C-407E-A947-70E740481C1C}">
+                <a14:useLocalDpi xmlns:a14="http://schemas.microsoft.com/office/drawing/2010/main" val="0"/>
+              </a:ext>
+            </a:extLst>
+          </a:blip>
+          <a:srcRect/>
+          <a:stretch>
+            <a:fillRect/>
+          </a:stretch>
+        </p:blipFill>
+        <p:spPr bwMode="auto">
+          <a:xfrm>
+            <a:off x="1" y="1"/>
+            <a:ext cx="9144000" cy="764703"/>
+          </a:xfrm>
+          <a:prstGeom prst="rect">
+            <a:avLst/>
+          </a:prstGeom>
+          <a:noFill/>
+          <a:ln>
+            <a:noFill/>
+          </a:ln>
+          <a:extLst>
+            <a:ext uri="{909E8E84-426E-40DD-AFC4-6F175D3DCCD1}">
+              <a14:hiddenFill xmlns:a14="http://schemas.microsoft.com/office/drawing/2010/main">
+                <a:solidFill>
+                  <a:schemeClr val="accent1"/>
+                </a:solidFill>
+              </a14:hiddenFill>
+            </a:ext>
+            <a:ext uri="{91240B29-F687-4F45-9708-019B960494DF}">
+              <a14:hiddenLine xmlns:a14="http://schemas.microsoft.com/office/drawing/2010/main" w="9525">
+                <a:solidFill>
+                  <a:schemeClr val="tx1"/>
+                </a:solidFill>
+                <a:miter lim="800000"/>
+                <a:headEnd/>
+                <a:tailEnd/>
+              </a14:hiddenLine>
+            </a:ext>
+          </a:extLst>
+        </p:spPr>
+      </p:pic>
+      <p:sp>
+        <p:nvSpPr>
+          <p:cNvPr id="2" name="Titel 1"/>
+          <p:cNvSpPr>
+            <a:spLocks noGrp="1"/>
+          </p:cNvSpPr>
+          <p:nvPr>
+            <p:ph type="title"/>
+          </p:nvPr>
+        </p:nvSpPr>
+        <p:spPr>
+          <a:xfrm>
+            <a:off x="32973" y="0"/>
+            <a:ext cx="8229600" cy="908720"/>
+          </a:xfrm>
+        </p:spPr>
+        <p:txBody>
+          <a:bodyPr>
+            <a:normAutofit/>
+          </a:bodyPr>
+          <a:lstStyle/>
+          <a:p>
+            <a:pPr algn="l"/>
+            <a:r>
+              <a:rPr lang="de-DE" sz="2800" dirty="0" smtClean="0">
+                <a:solidFill>
+                  <a:schemeClr val="bg1"/>
+                </a:solidFill>
+              </a:rPr>
+              <a:t>  Überblick technische Architektur</a:t>
+            </a:r>
+            <a:endParaRPr lang="de-DE" sz="2800" dirty="0">
+              <a:solidFill>
+                <a:schemeClr val="bg1"/>
+              </a:solidFill>
+            </a:endParaRPr>
+          </a:p>
+        </p:txBody>
+      </p:sp>
+      <p:pic>
+        <p:nvPicPr>
+          <p:cNvPr id="1026" name="Picture 2" descr="C:\Users\UBook\Documents\GitHub\Softwareprojekt_BIM\Technisches_Design\technische_architektur.png"/>
+          <p:cNvPicPr>
+            <a:picLocks noChangeAspect="1" noChangeArrowheads="1"/>
+          </p:cNvPicPr>
+          <p:nvPr/>
+        </p:nvPicPr>
+        <p:blipFill>
+          <a:blip r:embed="rId3">
+            <a:extLst>
+              <a:ext uri="{28A0092B-C50C-407E-A947-70E740481C1C}">
+                <a14:useLocalDpi xmlns:a14="http://schemas.microsoft.com/office/drawing/2010/main" val="0"/>
+              </a:ext>
+            </a:extLst>
+          </a:blip>
+          <a:srcRect/>
+          <a:stretch>
+            <a:fillRect/>
+          </a:stretch>
+        </p:blipFill>
+        <p:spPr bwMode="auto">
+          <a:xfrm>
+            <a:off x="749841" y="932547"/>
+            <a:ext cx="7782650" cy="5534328"/>
+          </a:xfrm>
+          <a:prstGeom prst="rect">
+            <a:avLst/>
+          </a:prstGeom>
+          <a:noFill/>
+          <a:extLst>
+            <a:ext uri="{909E8E84-426E-40DD-AFC4-6F175D3DCCD1}">
+              <a14:hiddenFill xmlns:a14="http://schemas.microsoft.com/office/drawing/2010/main">
+                <a:solidFill>
+                  <a:srgbClr val="FFFFFF"/>
+                </a:solidFill>
+              </a14:hiddenFill>
+            </a:ext>
+          </a:extLst>
+        </p:spPr>
+      </p:pic>
+    </p:spTree>
+    <p:extLst>
+      <p:ext uri="{BB962C8B-B14F-4D97-AF65-F5344CB8AC3E}">
+        <p14:creationId xmlns:p14="http://schemas.microsoft.com/office/powerpoint/2010/main" val="3757027305"/>
+      </p:ext>
+    </p:extLst>
+  </p:cSld>
+  <p:clrMapOvr>
+    <a:masterClrMapping/>
+  </p:clrMapOvr>
+  <p:timing>
+    <p:tnLst>
+      <p:par>
+        <p:cTn id="1" dur="indefinite" restart="never" nodeType="tmRoot"/>
+      </p:par>
+    </p:tnLst>
+  </p:timing>
+</p:sld>
+</file>
+
+<file path=ppt/slides/slide24.xml><?xml version="1.0" encoding="utf-8"?>
+<p:sld xmlns:a="http://schemas.openxmlformats.org/drawingml/2006/main" xmlns:r="http://schemas.openxmlformats.org/officeDocument/2006/relationships" xmlns:p="http://schemas.openxmlformats.org/presentationml/2006/main">
+  <p:cSld>
+    <p:spTree>
+      <p:nvGrpSpPr>
+        <p:cNvPr id="1" name=""/>
+        <p:cNvGrpSpPr/>
+        <p:nvPr/>
+      </p:nvGrpSpPr>
+      <p:grpSpPr>
+        <a:xfrm>
+          <a:off x="0" y="0"/>
+          <a:ext cx="0" cy="0"/>
+          <a:chOff x="0" y="0"/>
+          <a:chExt cx="0" cy="0"/>
+        </a:xfrm>
+      </p:grpSpPr>
+      <p:pic>
+        <p:nvPicPr>
+          <p:cNvPr id="3074" name="Picture 2"/>
+          <p:cNvPicPr>
+            <a:picLocks noChangeAspect="1" noChangeArrowheads="1"/>
+          </p:cNvPicPr>
+          <p:nvPr/>
+        </p:nvPicPr>
+        <p:blipFill>
+          <a:blip r:embed="rId2">
+            <a:extLst>
+              <a:ext uri="{28A0092B-C50C-407E-A947-70E740481C1C}">
+                <a14:useLocalDpi xmlns:a14="http://schemas.microsoft.com/office/drawing/2010/main" val="0"/>
+              </a:ext>
+            </a:extLst>
+          </a:blip>
+          <a:srcRect/>
+          <a:stretch>
+            <a:fillRect/>
+          </a:stretch>
+        </p:blipFill>
+        <p:spPr bwMode="auto">
+          <a:xfrm>
+            <a:off x="1" y="1"/>
+            <a:ext cx="9144000" cy="764703"/>
+          </a:xfrm>
+          <a:prstGeom prst="rect">
+            <a:avLst/>
+          </a:prstGeom>
+          <a:noFill/>
+          <a:ln>
+            <a:noFill/>
+          </a:ln>
+          <a:extLst>
+            <a:ext uri="{909E8E84-426E-40DD-AFC4-6F175D3DCCD1}">
+              <a14:hiddenFill xmlns:a14="http://schemas.microsoft.com/office/drawing/2010/main">
+                <a:solidFill>
+                  <a:schemeClr val="accent1"/>
+                </a:solidFill>
+              </a14:hiddenFill>
+            </a:ext>
+            <a:ext uri="{91240B29-F687-4F45-9708-019B960494DF}">
+              <a14:hiddenLine xmlns:a14="http://schemas.microsoft.com/office/drawing/2010/main" w="9525">
+                <a:solidFill>
+                  <a:schemeClr val="tx1"/>
+                </a:solidFill>
+                <a:miter lim="800000"/>
+                <a:headEnd/>
+                <a:tailEnd/>
+              </a14:hiddenLine>
+            </a:ext>
+          </a:extLst>
+        </p:spPr>
+      </p:pic>
+      <p:sp>
+        <p:nvSpPr>
+          <p:cNvPr id="2" name="Titel 1"/>
+          <p:cNvSpPr>
+            <a:spLocks noGrp="1"/>
+          </p:cNvSpPr>
+          <p:nvPr>
+            <p:ph type="title"/>
+          </p:nvPr>
+        </p:nvSpPr>
+        <p:spPr>
+          <a:xfrm>
+            <a:off x="32973" y="0"/>
+            <a:ext cx="8229600" cy="908720"/>
+          </a:xfrm>
+        </p:spPr>
+        <p:txBody>
+          <a:bodyPr>
+            <a:normAutofit/>
+          </a:bodyPr>
+          <a:lstStyle/>
+          <a:p>
+            <a:pPr algn="l"/>
+            <a:r>
+              <a:rPr lang="de-DE" sz="2800" dirty="0" smtClean="0">
+                <a:solidFill>
+                  <a:schemeClr val="bg1"/>
+                </a:solidFill>
+              </a:rPr>
+              <a:t>  Überblick technische Architektur</a:t>
             </a:r>
             <a:endParaRPr lang="de-DE" sz="2800" dirty="0">
               <a:solidFill>
@@ -6837,15 +8132,7 @@
                   <a:schemeClr val="bg1"/>
                 </a:solidFill>
               </a:rPr>
-              <a:t>  </a:t>
-            </a:r>
-            <a:r>
-              <a:rPr lang="de-DE" sz="2800" dirty="0" smtClean="0">
-                <a:solidFill>
-                  <a:schemeClr val="bg1"/>
-                </a:solidFill>
-              </a:rPr>
-              <a:t>Kick-off Meeting</a:t>
+              <a:t>  Kick-off Meeting</a:t>
             </a:r>
             <a:endParaRPr lang="de-DE" sz="2800" dirty="0">
               <a:solidFill>
@@ -6926,7 +8213,7 @@
             </a:r>
             <a:r>
               <a:rPr lang="de-DE" sz="3200" dirty="0" err="1" smtClean="0"/>
-              <a:t>Github</a:t>
+              <a:t>Git</a:t>
             </a:r>
             <a:endParaRPr lang="de-DE" sz="3200" dirty="0" smtClean="0"/>
           </a:p>
@@ -7138,15 +8425,7 @@
                   <a:schemeClr val="bg1"/>
                 </a:solidFill>
               </a:rPr>
-              <a:t>  </a:t>
-            </a:r>
-            <a:r>
-              <a:rPr lang="de-DE" sz="2800" dirty="0" smtClean="0">
-                <a:solidFill>
-                  <a:schemeClr val="bg1"/>
-                </a:solidFill>
-              </a:rPr>
-              <a:t>Risikoliste</a:t>
+              <a:t>  Risikoliste</a:t>
             </a:r>
             <a:endParaRPr lang="de-DE" sz="2800" dirty="0">
               <a:solidFill>
@@ -7496,15 +8775,7 @@
                   <a:schemeClr val="bg1"/>
                 </a:solidFill>
               </a:rPr>
-              <a:t>  </a:t>
-            </a:r>
-            <a:r>
-              <a:rPr lang="de-DE" sz="2800" dirty="0" smtClean="0">
-                <a:solidFill>
-                  <a:schemeClr val="bg1"/>
-                </a:solidFill>
-              </a:rPr>
-              <a:t>Risikoliste</a:t>
+              <a:t>  Risikoliste</a:t>
             </a:r>
             <a:endParaRPr lang="de-DE" sz="2800" dirty="0">
               <a:solidFill>
@@ -7718,7 +8989,7 @@
             </a:r>
             <a:r>
               <a:rPr lang="de-DE" sz="2400" dirty="0" err="1" smtClean="0"/>
-              <a:t>Github</a:t>
+              <a:t>GitHub</a:t>
             </a:r>
             <a:r>
               <a:rPr lang="de-DE" sz="2400" dirty="0"/>
@@ -7863,15 +9134,7 @@
                   <a:schemeClr val="bg1"/>
                 </a:solidFill>
               </a:rPr>
-              <a:t>  </a:t>
-            </a:r>
-            <a:r>
-              <a:rPr lang="de-DE" sz="2800" dirty="0" smtClean="0">
-                <a:solidFill>
-                  <a:schemeClr val="bg1"/>
-                </a:solidFill>
-              </a:rPr>
-              <a:t>Risikoliste</a:t>
+              <a:t>  Risikoliste</a:t>
             </a:r>
             <a:endParaRPr lang="de-DE" sz="2800" dirty="0">
               <a:solidFill>
@@ -8231,15 +9494,7 @@
                   <a:schemeClr val="bg1"/>
                 </a:solidFill>
               </a:rPr>
-              <a:t>  </a:t>
-            </a:r>
-            <a:r>
-              <a:rPr lang="de-DE" sz="2800" dirty="0" smtClean="0">
-                <a:solidFill>
-                  <a:schemeClr val="bg1"/>
-                </a:solidFill>
-              </a:rPr>
-              <a:t>Risikoliste</a:t>
+              <a:t>  Risikoliste</a:t>
             </a:r>
             <a:endParaRPr lang="de-DE" sz="2800" dirty="0">
               <a:solidFill>
@@ -8445,7 +9700,7 @@
             </a:r>
             <a:r>
               <a:rPr lang="de-DE" sz="2400" dirty="0" err="1" smtClean="0"/>
-              <a:t>Github</a:t>
+              <a:t>GitHub</a:t>
             </a:r>
             <a:r>
               <a:rPr lang="de-DE" sz="2400" dirty="0" smtClean="0"/>
@@ -8592,15 +9847,7 @@
                   <a:schemeClr val="bg1"/>
                 </a:solidFill>
               </a:rPr>
-              <a:t>  </a:t>
-            </a:r>
-            <a:r>
-              <a:rPr lang="de-DE" sz="2800" dirty="0" smtClean="0">
-                <a:solidFill>
-                  <a:schemeClr val="bg1"/>
-                </a:solidFill>
-              </a:rPr>
-              <a:t>Strukturplan</a:t>
+              <a:t>  Strukturplan</a:t>
             </a:r>
             <a:endParaRPr lang="de-DE" sz="2800" dirty="0">
               <a:solidFill>
@@ -8787,7 +10034,7 @@
     </p:spTree>
     <p:extLst>
       <p:ext uri="{BB962C8B-B14F-4D97-AF65-F5344CB8AC3E}">
-        <p14:creationId xmlns:p14="http://schemas.microsoft.com/office/powerpoint/2010/main" val="1405763892"/>
+        <p14:creationId xmlns:p14="http://schemas.microsoft.com/office/powerpoint/2010/main" val="45462324"/>
       </p:ext>
     </p:extLst>
   </p:cSld>
@@ -8904,15 +10151,7 @@
                   <a:schemeClr val="bg1"/>
                 </a:solidFill>
               </a:rPr>
-              <a:t>  </a:t>
-            </a:r>
-            <a:r>
-              <a:rPr lang="de-DE" sz="2800" dirty="0" smtClean="0">
-                <a:solidFill>
-                  <a:schemeClr val="bg1"/>
-                </a:solidFill>
-              </a:rPr>
-              <a:t>Strukturplan</a:t>
+              <a:t>  Strukturplan</a:t>
             </a:r>
             <a:endParaRPr lang="de-DE" sz="2800" dirty="0">
               <a:solidFill>

</xml_diff>

<commit_message>
Kosmetische Änderung für Präsentation
</commit_message>
<xml_diff>
--- a/Doku/Praesi1.pptx
+++ b/Doku/Praesi1.pptx
@@ -311,7 +311,7 @@
           <a:p>
             <a:fld id="{CF2933F3-F04D-48C8-9880-7A8EA4FF7473}" type="datetimeFigureOut">
               <a:rPr lang="de-DE" smtClean="0"/>
-              <a:t>12.11.2014</a:t>
+              <a:t>12.11.14</a:t>
             </a:fld>
             <a:endParaRPr lang="de-DE"/>
           </a:p>
@@ -481,7 +481,7 @@
           <a:p>
             <a:fld id="{CF2933F3-F04D-48C8-9880-7A8EA4FF7473}" type="datetimeFigureOut">
               <a:rPr lang="de-DE" smtClean="0"/>
-              <a:t>12.11.2014</a:t>
+              <a:t>12.11.14</a:t>
             </a:fld>
             <a:endParaRPr lang="de-DE"/>
           </a:p>
@@ -661,7 +661,7 @@
           <a:p>
             <a:fld id="{CF2933F3-F04D-48C8-9880-7A8EA4FF7473}" type="datetimeFigureOut">
               <a:rPr lang="de-DE" smtClean="0"/>
-              <a:t>12.11.2014</a:t>
+              <a:t>12.11.14</a:t>
             </a:fld>
             <a:endParaRPr lang="de-DE"/>
           </a:p>
@@ -831,7 +831,7 @@
           <a:p>
             <a:fld id="{CF2933F3-F04D-48C8-9880-7A8EA4FF7473}" type="datetimeFigureOut">
               <a:rPr lang="de-DE" smtClean="0"/>
-              <a:t>12.11.2014</a:t>
+              <a:t>12.11.14</a:t>
             </a:fld>
             <a:endParaRPr lang="de-DE"/>
           </a:p>
@@ -1077,7 +1077,7 @@
           <a:p>
             <a:fld id="{CF2933F3-F04D-48C8-9880-7A8EA4FF7473}" type="datetimeFigureOut">
               <a:rPr lang="de-DE" smtClean="0"/>
-              <a:t>12.11.2014</a:t>
+              <a:t>12.11.14</a:t>
             </a:fld>
             <a:endParaRPr lang="de-DE"/>
           </a:p>
@@ -1365,7 +1365,7 @@
           <a:p>
             <a:fld id="{CF2933F3-F04D-48C8-9880-7A8EA4FF7473}" type="datetimeFigureOut">
               <a:rPr lang="de-DE" smtClean="0"/>
-              <a:t>12.11.2014</a:t>
+              <a:t>12.11.14</a:t>
             </a:fld>
             <a:endParaRPr lang="de-DE"/>
           </a:p>
@@ -1787,7 +1787,7 @@
           <a:p>
             <a:fld id="{CF2933F3-F04D-48C8-9880-7A8EA4FF7473}" type="datetimeFigureOut">
               <a:rPr lang="de-DE" smtClean="0"/>
-              <a:t>12.11.2014</a:t>
+              <a:t>12.11.14</a:t>
             </a:fld>
             <a:endParaRPr lang="de-DE"/>
           </a:p>
@@ -1905,7 +1905,7 @@
           <a:p>
             <a:fld id="{CF2933F3-F04D-48C8-9880-7A8EA4FF7473}" type="datetimeFigureOut">
               <a:rPr lang="de-DE" smtClean="0"/>
-              <a:t>12.11.2014</a:t>
+              <a:t>12.11.14</a:t>
             </a:fld>
             <a:endParaRPr lang="de-DE"/>
           </a:p>
@@ -2000,7 +2000,7 @@
           <a:p>
             <a:fld id="{CF2933F3-F04D-48C8-9880-7A8EA4FF7473}" type="datetimeFigureOut">
               <a:rPr lang="de-DE" smtClean="0"/>
-              <a:t>12.11.2014</a:t>
+              <a:t>12.11.14</a:t>
             </a:fld>
             <a:endParaRPr lang="de-DE"/>
           </a:p>
@@ -2277,7 +2277,7 @@
           <a:p>
             <a:fld id="{CF2933F3-F04D-48C8-9880-7A8EA4FF7473}" type="datetimeFigureOut">
               <a:rPr lang="de-DE" smtClean="0"/>
-              <a:t>12.11.2014</a:t>
+              <a:t>12.11.14</a:t>
             </a:fld>
             <a:endParaRPr lang="de-DE"/>
           </a:p>
@@ -2530,7 +2530,7 @@
           <a:p>
             <a:fld id="{CF2933F3-F04D-48C8-9880-7A8EA4FF7473}" type="datetimeFigureOut">
               <a:rPr lang="de-DE" smtClean="0"/>
-              <a:t>12.11.2014</a:t>
+              <a:t>12.11.14</a:t>
             </a:fld>
             <a:endParaRPr lang="de-DE"/>
           </a:p>
@@ -2743,7 +2743,7 @@
           <a:p>
             <a:fld id="{CF2933F3-F04D-48C8-9880-7A8EA4FF7473}" type="datetimeFigureOut">
               <a:rPr lang="de-DE" smtClean="0"/>
-              <a:t>12.11.2014</a:t>
+              <a:t>12.11.14</a:t>
             </a:fld>
             <a:endParaRPr lang="de-DE"/>
           </a:p>
@@ -3152,14 +3152,14 @@
             <a:noFill/>
           </a:ln>
           <a:extLst>
-            <a:ext uri="{909E8E84-426E-40DD-AFC4-6F175D3DCCD1}">
+            <a:ext uri="{909E8E84-426E-40dd-AFC4-6F175D3DCCD1}">
               <a14:hiddenFill xmlns:a14="http://schemas.microsoft.com/office/drawing/2010/main">
                 <a:solidFill>
                   <a:schemeClr val="accent1"/>
                 </a:solidFill>
               </a14:hiddenFill>
             </a:ext>
-            <a:ext uri="{91240B29-F687-4F45-9708-019B960494DF}">
+            <a:ext uri="{91240B29-F687-4f45-9708-019B960494DF}">
               <a14:hiddenLine xmlns:a14="http://schemas.microsoft.com/office/drawing/2010/main" w="9525">
                 <a:solidFill>
                   <a:schemeClr val="tx1"/>
@@ -3256,14 +3256,14 @@
             <a:noFill/>
           </a:ln>
           <a:extLst>
-            <a:ext uri="{909E8E84-426E-40DD-AFC4-6F175D3DCCD1}">
+            <a:ext uri="{909E8E84-426E-40dd-AFC4-6F175D3DCCD1}">
               <a14:hiddenFill xmlns:a14="http://schemas.microsoft.com/office/drawing/2010/main">
                 <a:solidFill>
                   <a:schemeClr val="accent1"/>
                 </a:solidFill>
               </a14:hiddenFill>
             </a:ext>
-            <a:ext uri="{91240B29-F687-4F45-9708-019B960494DF}">
+            <a:ext uri="{91240B29-F687-4f45-9708-019B960494DF}">
               <a14:hiddenLine xmlns:a14="http://schemas.microsoft.com/office/drawing/2010/main" w="9525">
                 <a:solidFill>
                   <a:schemeClr val="tx1"/>
@@ -3311,14 +3311,14 @@
           </a:ln>
           <a:effectLst/>
           <a:extLst>
-            <a:ext uri="{909E8E84-426E-40DD-AFC4-6F175D3DCCD1}">
+            <a:ext uri="{909E8E84-426E-40dd-AFC4-6F175D3DCCD1}">
               <a14:hiddenFill xmlns:a14="http://schemas.microsoft.com/office/drawing/2010/main">
                 <a:solidFill>
                   <a:schemeClr val="accent1"/>
                 </a:solidFill>
               </a14:hiddenFill>
             </a:ext>
-            <a:ext uri="{91240B29-F687-4F45-9708-019B960494DF}">
+            <a:ext uri="{91240B29-F687-4f45-9708-019B960494DF}">
               <a14:hiddenLine xmlns:a14="http://schemas.microsoft.com/office/drawing/2010/main" w="9525">
                 <a:solidFill>
                   <a:schemeClr val="tx1"/>
@@ -3328,7 +3328,7 @@
                 <a:tailEnd/>
               </a14:hiddenLine>
             </a:ext>
-            <a:ext uri="{AF507438-7753-43E0-B8FC-AC1667EBCBE1}">
+            <a:ext uri="{AF507438-7753-43e0-B8FC-AC1667EBCBE1}">
               <a14:hiddenEffects xmlns:a14="http://schemas.microsoft.com/office/drawing/2010/main">
                 <a:effectLst>
                   <a:outerShdw dist="35921" dir="2700000" algn="ctr" rotWithShape="0">
@@ -3412,7 +3412,7 @@
   <p:timing>
     <p:tnLst>
       <p:par>
-        <p:cTn id="1" dur="indefinite" restart="never" nodeType="tmRoot"/>
+        <p:cTn xmlns:p14="http://schemas.microsoft.com/office/powerpoint/2010/main" id="1" dur="indefinite" restart="never" nodeType="tmRoot"/>
       </p:par>
     </p:tnLst>
   </p:timing>
@@ -3470,14 +3470,14 @@
             <a:noFill/>
           </a:ln>
           <a:extLst>
-            <a:ext uri="{909E8E84-426E-40DD-AFC4-6F175D3DCCD1}">
+            <a:ext uri="{909E8E84-426E-40dd-AFC4-6F175D3DCCD1}">
               <a14:hiddenFill xmlns:a14="http://schemas.microsoft.com/office/drawing/2010/main">
                 <a:solidFill>
                   <a:schemeClr val="accent1"/>
                 </a:solidFill>
               </a14:hiddenFill>
             </a:ext>
-            <a:ext uri="{91240B29-F687-4F45-9708-019B960494DF}">
+            <a:ext uri="{91240B29-F687-4f45-9708-019B960494DF}">
               <a14:hiddenLine xmlns:a14="http://schemas.microsoft.com/office/drawing/2010/main" w="9525">
                 <a:solidFill>
                   <a:schemeClr val="tx1"/>
@@ -3696,7 +3696,7 @@
   <p:timing>
     <p:tnLst>
       <p:par>
-        <p:cTn id="1" dur="indefinite" restart="never" nodeType="tmRoot"/>
+        <p:cTn xmlns:p14="http://schemas.microsoft.com/office/powerpoint/2010/main" id="1" dur="indefinite" restart="never" nodeType="tmRoot"/>
       </p:par>
     </p:tnLst>
   </p:timing>
@@ -3754,14 +3754,14 @@
             <a:noFill/>
           </a:ln>
           <a:extLst>
-            <a:ext uri="{909E8E84-426E-40DD-AFC4-6F175D3DCCD1}">
+            <a:ext uri="{909E8E84-426E-40dd-AFC4-6F175D3DCCD1}">
               <a14:hiddenFill xmlns:a14="http://schemas.microsoft.com/office/drawing/2010/main">
                 <a:solidFill>
                   <a:schemeClr val="accent1"/>
                 </a:solidFill>
               </a14:hiddenFill>
             </a:ext>
-            <a:ext uri="{91240B29-F687-4F45-9708-019B960494DF}">
+            <a:ext uri="{91240B29-F687-4f45-9708-019B960494DF}">
               <a14:hiddenLine xmlns:a14="http://schemas.microsoft.com/office/drawing/2010/main" w="9525">
                 <a:solidFill>
                   <a:schemeClr val="tx1"/>
@@ -4020,7 +4020,7 @@
   <p:timing>
     <p:tnLst>
       <p:par>
-        <p:cTn id="1" dur="indefinite" restart="never" nodeType="tmRoot"/>
+        <p:cTn xmlns:p14="http://schemas.microsoft.com/office/powerpoint/2010/main" id="1" dur="indefinite" restart="never" nodeType="tmRoot"/>
       </p:par>
     </p:tnLst>
   </p:timing>
@@ -4078,14 +4078,14 @@
             <a:noFill/>
           </a:ln>
           <a:extLst>
-            <a:ext uri="{909E8E84-426E-40DD-AFC4-6F175D3DCCD1}">
+            <a:ext uri="{909E8E84-426E-40dd-AFC4-6F175D3DCCD1}">
               <a14:hiddenFill xmlns:a14="http://schemas.microsoft.com/office/drawing/2010/main">
                 <a:solidFill>
                   <a:schemeClr val="accent1"/>
                 </a:solidFill>
               </a14:hiddenFill>
             </a:ext>
-            <a:ext uri="{91240B29-F687-4F45-9708-019B960494DF}">
+            <a:ext uri="{91240B29-F687-4f45-9708-019B960494DF}">
               <a14:hiddenLine xmlns:a14="http://schemas.microsoft.com/office/drawing/2010/main" w="9525">
                 <a:solidFill>
                   <a:schemeClr val="tx1"/>
@@ -4304,7 +4304,7 @@
   <p:timing>
     <p:tnLst>
       <p:par>
-        <p:cTn id="1" dur="indefinite" restart="never" nodeType="tmRoot"/>
+        <p:cTn xmlns:p14="http://schemas.microsoft.com/office/powerpoint/2010/main" id="1" dur="indefinite" restart="never" nodeType="tmRoot"/>
       </p:par>
     </p:tnLst>
   </p:timing>
@@ -4362,14 +4362,14 @@
             <a:noFill/>
           </a:ln>
           <a:extLst>
-            <a:ext uri="{909E8E84-426E-40DD-AFC4-6F175D3DCCD1}">
+            <a:ext uri="{909E8E84-426E-40dd-AFC4-6F175D3DCCD1}">
               <a14:hiddenFill xmlns:a14="http://schemas.microsoft.com/office/drawing/2010/main">
                 <a:solidFill>
                   <a:schemeClr val="accent1"/>
                 </a:solidFill>
               </a14:hiddenFill>
             </a:ext>
-            <a:ext uri="{91240B29-F687-4F45-9708-019B960494DF}">
+            <a:ext uri="{91240B29-F687-4f45-9708-019B960494DF}">
               <a14:hiddenLine xmlns:a14="http://schemas.microsoft.com/office/drawing/2010/main" w="9525">
                 <a:solidFill>
                   <a:schemeClr val="tx1"/>
@@ -4608,7 +4608,7 @@
   <p:timing>
     <p:tnLst>
       <p:par>
-        <p:cTn id="1" dur="indefinite" restart="never" nodeType="tmRoot"/>
+        <p:cTn xmlns:p14="http://schemas.microsoft.com/office/powerpoint/2010/main" id="1" dur="indefinite" restart="never" nodeType="tmRoot"/>
       </p:par>
     </p:tnLst>
   </p:timing>
@@ -4666,14 +4666,14 @@
             <a:noFill/>
           </a:ln>
           <a:extLst>
-            <a:ext uri="{909E8E84-426E-40DD-AFC4-6F175D3DCCD1}">
+            <a:ext uri="{909E8E84-426E-40dd-AFC4-6F175D3DCCD1}">
               <a14:hiddenFill xmlns:a14="http://schemas.microsoft.com/office/drawing/2010/main">
                 <a:solidFill>
                   <a:schemeClr val="accent1"/>
                 </a:solidFill>
               </a14:hiddenFill>
             </a:ext>
-            <a:ext uri="{91240B29-F687-4F45-9708-019B960494DF}">
+            <a:ext uri="{91240B29-F687-4f45-9708-019B960494DF}">
               <a14:hiddenLine xmlns:a14="http://schemas.microsoft.com/office/drawing/2010/main" w="9525">
                 <a:solidFill>
                   <a:schemeClr val="tx1"/>
@@ -4912,7 +4912,7 @@
   <p:timing>
     <p:tnLst>
       <p:par>
-        <p:cTn id="1" dur="indefinite" restart="never" nodeType="tmRoot"/>
+        <p:cTn xmlns:p14="http://schemas.microsoft.com/office/powerpoint/2010/main" id="1" dur="indefinite" restart="never" nodeType="tmRoot"/>
       </p:par>
     </p:tnLst>
   </p:timing>
@@ -4970,14 +4970,14 @@
             <a:noFill/>
           </a:ln>
           <a:extLst>
-            <a:ext uri="{909E8E84-426E-40DD-AFC4-6F175D3DCCD1}">
+            <a:ext uri="{909E8E84-426E-40dd-AFC4-6F175D3DCCD1}">
               <a14:hiddenFill xmlns:a14="http://schemas.microsoft.com/office/drawing/2010/main">
                 <a:solidFill>
                   <a:schemeClr val="accent1"/>
                 </a:solidFill>
               </a14:hiddenFill>
             </a:ext>
-            <a:ext uri="{91240B29-F687-4F45-9708-019B960494DF}">
+            <a:ext uri="{91240B29-F687-4f45-9708-019B960494DF}">
               <a14:hiddenLine xmlns:a14="http://schemas.microsoft.com/office/drawing/2010/main" w="9525">
                 <a:solidFill>
                   <a:schemeClr val="tx1"/>
@@ -5209,7 +5209,7 @@
   <p:timing>
     <p:tnLst>
       <p:par>
-        <p:cTn id="1" dur="indefinite" restart="never" nodeType="tmRoot"/>
+        <p:cTn xmlns:p14="http://schemas.microsoft.com/office/powerpoint/2010/main" id="1" dur="indefinite" restart="never" nodeType="tmRoot"/>
       </p:par>
     </p:tnLst>
   </p:timing>
@@ -5267,14 +5267,14 @@
             <a:noFill/>
           </a:ln>
           <a:extLst>
-            <a:ext uri="{909E8E84-426E-40DD-AFC4-6F175D3DCCD1}">
+            <a:ext uri="{909E8E84-426E-40dd-AFC4-6F175D3DCCD1}">
               <a14:hiddenFill xmlns:a14="http://schemas.microsoft.com/office/drawing/2010/main">
                 <a:solidFill>
                   <a:schemeClr val="accent1"/>
                 </a:solidFill>
               </a14:hiddenFill>
             </a:ext>
-            <a:ext uri="{91240B29-F687-4F45-9708-019B960494DF}">
+            <a:ext uri="{91240B29-F687-4f45-9708-019B960494DF}">
               <a14:hiddenLine xmlns:a14="http://schemas.microsoft.com/office/drawing/2010/main" w="9525">
                 <a:solidFill>
                   <a:schemeClr val="tx1"/>
@@ -5393,15 +5393,7 @@
             </a:pPr>
             <a:r>
               <a:rPr lang="de-DE" sz="2800" dirty="0" smtClean="0"/>
-              <a:t>Alle Projektmitglieder jeweils 8 Std./</a:t>
-            </a:r>
-            <a:r>
-              <a:rPr lang="de-DE" sz="2800" dirty="0" smtClean="0"/>
-              <a:t>W</a:t>
-            </a:r>
-            <a:r>
-              <a:rPr lang="de-DE" sz="2800" dirty="0" smtClean="0"/>
-              <a:t>oche</a:t>
+              <a:t>Alle Projektmitglieder jeweils 8 Std./Woche</a:t>
             </a:r>
           </a:p>
           <a:p>
@@ -5503,7 +5495,7 @@
   <p:timing>
     <p:tnLst>
       <p:par>
-        <p:cTn id="1" dur="indefinite" restart="never" nodeType="tmRoot"/>
+        <p:cTn xmlns:p14="http://schemas.microsoft.com/office/powerpoint/2010/main" id="1" dur="indefinite" restart="never" nodeType="tmRoot"/>
       </p:par>
     </p:tnLst>
   </p:timing>
@@ -5561,14 +5553,14 @@
             <a:noFill/>
           </a:ln>
           <a:extLst>
-            <a:ext uri="{909E8E84-426E-40DD-AFC4-6F175D3DCCD1}">
+            <a:ext uri="{909E8E84-426E-40dd-AFC4-6F175D3DCCD1}">
               <a14:hiddenFill xmlns:a14="http://schemas.microsoft.com/office/drawing/2010/main">
                 <a:solidFill>
                   <a:schemeClr val="accent1"/>
                 </a:solidFill>
               </a14:hiddenFill>
             </a:ext>
-            <a:ext uri="{91240B29-F687-4F45-9708-019B960494DF}">
+            <a:ext uri="{91240B29-F687-4f45-9708-019B960494DF}">
               <a14:hiddenLine xmlns:a14="http://schemas.microsoft.com/office/drawing/2010/main" w="9525">
                 <a:solidFill>
                   <a:schemeClr val="tx1"/>
@@ -5652,14 +5644,14 @@
             <a:noFill/>
           </a:ln>
           <a:extLst>
-            <a:ext uri="{909E8E84-426E-40DD-AFC4-6F175D3DCCD1}">
+            <a:ext uri="{909E8E84-426E-40dd-AFC4-6F175D3DCCD1}">
               <a14:hiddenFill xmlns:a14="http://schemas.microsoft.com/office/drawing/2010/main">
                 <a:solidFill>
                   <a:schemeClr val="accent1"/>
                 </a:solidFill>
               </a14:hiddenFill>
             </a:ext>
-            <a:ext uri="{91240B29-F687-4F45-9708-019B960494DF}">
+            <a:ext uri="{91240B29-F687-4f45-9708-019B960494DF}">
               <a14:hiddenLine xmlns:a14="http://schemas.microsoft.com/office/drawing/2010/main" w="9525">
                 <a:solidFill>
                   <a:schemeClr val="tx1"/>
@@ -5685,7 +5677,7 @@
   <p:timing>
     <p:tnLst>
       <p:par>
-        <p:cTn id="1" dur="indefinite" restart="never" nodeType="tmRoot"/>
+        <p:cTn xmlns:p14="http://schemas.microsoft.com/office/powerpoint/2010/main" id="1" dur="indefinite" restart="never" nodeType="tmRoot"/>
       </p:par>
     </p:tnLst>
   </p:timing>
@@ -5743,14 +5735,14 @@
             <a:noFill/>
           </a:ln>
           <a:extLst>
-            <a:ext uri="{909E8E84-426E-40DD-AFC4-6F175D3DCCD1}">
+            <a:ext uri="{909E8E84-426E-40dd-AFC4-6F175D3DCCD1}">
               <a14:hiddenFill xmlns:a14="http://schemas.microsoft.com/office/drawing/2010/main">
                 <a:solidFill>
                   <a:schemeClr val="accent1"/>
                 </a:solidFill>
               </a14:hiddenFill>
             </a:ext>
-            <a:ext uri="{91240B29-F687-4F45-9708-019B960494DF}">
+            <a:ext uri="{91240B29-F687-4f45-9708-019B960494DF}">
               <a14:hiddenLine xmlns:a14="http://schemas.microsoft.com/office/drawing/2010/main" w="9525">
                 <a:solidFill>
                   <a:schemeClr val="tx1"/>
@@ -5979,7 +5971,6 @@
               <a:rPr lang="de-DE" sz="2800" dirty="0" smtClean="0"/>
               <a:t>Fehlermeldung</a:t>
             </a:r>
-            <a:endParaRPr lang="de-DE" sz="2800" dirty="0" smtClean="0"/>
           </a:p>
           <a:p>
             <a:pPr>
@@ -6002,7 +5993,6 @@
               <a:rPr lang="de-DE" sz="2800" dirty="0" smtClean="0"/>
               <a:t>Stundenplan wurde erstellt</a:t>
             </a:r>
-            <a:endParaRPr lang="de-DE" sz="2800" dirty="0" smtClean="0"/>
           </a:p>
         </p:txBody>
       </p:sp>
@@ -6019,7 +6009,7 @@
   <p:timing>
     <p:tnLst>
       <p:par>
-        <p:cTn id="1" dur="indefinite" restart="never" nodeType="tmRoot"/>
+        <p:cTn xmlns:p14="http://schemas.microsoft.com/office/powerpoint/2010/main" id="1" dur="indefinite" restart="never" nodeType="tmRoot"/>
       </p:par>
     </p:tnLst>
   </p:timing>
@@ -6077,14 +6067,14 @@
             <a:noFill/>
           </a:ln>
           <a:extLst>
-            <a:ext uri="{909E8E84-426E-40DD-AFC4-6F175D3DCCD1}">
+            <a:ext uri="{909E8E84-426E-40dd-AFC4-6F175D3DCCD1}">
               <a14:hiddenFill xmlns:a14="http://schemas.microsoft.com/office/drawing/2010/main">
                 <a:solidFill>
                   <a:schemeClr val="accent1"/>
                 </a:solidFill>
               </a14:hiddenFill>
             </a:ext>
-            <a:ext uri="{91240B29-F687-4F45-9708-019B960494DF}">
+            <a:ext uri="{91240B29-F687-4f45-9708-019B960494DF}">
               <a14:hiddenLine xmlns:a14="http://schemas.microsoft.com/office/drawing/2010/main" w="9525">
                 <a:solidFill>
                   <a:schemeClr val="tx1"/>
@@ -6145,7 +6135,7 @@
         <p:spPr>
           <a:xfrm>
             <a:off x="385638" y="836712"/>
-            <a:ext cx="8506841" cy="5355312"/>
+            <a:ext cx="8506841" cy="5965735"/>
           </a:xfrm>
           <a:prstGeom prst="rect">
             <a:avLst/>
@@ -6194,7 +6184,15 @@
             </a:r>
             <a:r>
               <a:rPr lang="de-DE" sz="2800" dirty="0" smtClean="0"/>
-              <a:t>Kommunikationsaufbau vom/zum Dozent</a:t>
+              <a:t>Kommunikationsaufbau vom/</a:t>
+            </a:r>
+            <a:r>
+              <a:rPr lang="de-DE" sz="2800" smtClean="0"/>
+              <a:t>zum </a:t>
+            </a:r>
+            <a:r>
+              <a:rPr lang="de-DE" sz="2800" smtClean="0"/>
+              <a:t>	Dozent</a:t>
             </a:r>
             <a:endParaRPr lang="de-DE" sz="2800" b="1" dirty="0" smtClean="0">
               <a:solidFill>
@@ -6241,7 +6239,6 @@
               <a:rPr lang="de-DE" sz="2800" dirty="0" smtClean="0"/>
               <a:t>begonnen haben</a:t>
             </a:r>
-            <a:endParaRPr lang="de-DE" sz="2800" dirty="0" smtClean="0"/>
           </a:p>
           <a:p>
             <a:pPr>
@@ -6326,7 +6323,6 @@
               <a:rPr lang="de-DE" sz="2800" dirty="0" smtClean="0"/>
               <a:t>wurden aufgenommen</a:t>
             </a:r>
-            <a:endParaRPr lang="de-DE" sz="2800" dirty="0" smtClean="0"/>
           </a:p>
         </p:txBody>
       </p:sp>
@@ -6343,7 +6339,7 @@
   <p:timing>
     <p:tnLst>
       <p:par>
-        <p:cTn id="1" dur="indefinite" restart="never" nodeType="tmRoot"/>
+        <p:cTn xmlns:p14="http://schemas.microsoft.com/office/powerpoint/2010/main" id="1" dur="indefinite" restart="never" nodeType="tmRoot"/>
       </p:par>
     </p:tnLst>
   </p:timing>
@@ -6401,14 +6397,14 @@
             <a:noFill/>
           </a:ln>
           <a:extLst>
-            <a:ext uri="{909E8E84-426E-40DD-AFC4-6F175D3DCCD1}">
+            <a:ext uri="{909E8E84-426E-40dd-AFC4-6F175D3DCCD1}">
               <a14:hiddenFill xmlns:a14="http://schemas.microsoft.com/office/drawing/2010/main">
                 <a:solidFill>
                   <a:schemeClr val="accent1"/>
                 </a:solidFill>
               </a14:hiddenFill>
             </a:ext>
-            <a:ext uri="{91240B29-F687-4F45-9708-019B960494DF}">
+            <a:ext uri="{91240B29-F687-4f45-9708-019B960494DF}">
               <a14:hiddenLine xmlns:a14="http://schemas.microsoft.com/office/drawing/2010/main" w="9525">
                 <a:solidFill>
                   <a:schemeClr val="tx1"/>
@@ -6803,7 +6799,7 @@
   <p:timing>
     <p:tnLst>
       <p:par>
-        <p:cTn id="1" dur="indefinite" restart="never" nodeType="tmRoot"/>
+        <p:cTn xmlns:p14="http://schemas.microsoft.com/office/powerpoint/2010/main" id="1" dur="indefinite" restart="never" nodeType="tmRoot"/>
       </p:par>
     </p:tnLst>
   </p:timing>
@@ -6861,14 +6857,14 @@
             <a:noFill/>
           </a:ln>
           <a:extLst>
-            <a:ext uri="{909E8E84-426E-40DD-AFC4-6F175D3DCCD1}">
+            <a:ext uri="{909E8E84-426E-40dd-AFC4-6F175D3DCCD1}">
               <a14:hiddenFill xmlns:a14="http://schemas.microsoft.com/office/drawing/2010/main">
                 <a:solidFill>
                   <a:schemeClr val="accent1"/>
                 </a:solidFill>
               </a14:hiddenFill>
             </a:ext>
-            <a:ext uri="{91240B29-F687-4F45-9708-019B960494DF}">
+            <a:ext uri="{91240B29-F687-4f45-9708-019B960494DF}">
               <a14:hiddenLine xmlns:a14="http://schemas.microsoft.com/office/drawing/2010/main" w="9525">
                 <a:solidFill>
                   <a:schemeClr val="tx1"/>
@@ -7025,7 +7021,6 @@
               <a:rPr lang="de-DE" sz="2800" dirty="0" smtClean="0"/>
               <a:t>wurde durchgeführt</a:t>
             </a:r>
-            <a:endParaRPr lang="de-DE" sz="2800" dirty="0" smtClean="0"/>
           </a:p>
           <a:p>
             <a:pPr>
@@ -7110,7 +7105,6 @@
               <a:rPr lang="de-DE" sz="2800" dirty="0" smtClean="0"/>
               <a:t>auf dem Bildschirm angezeigt</a:t>
             </a:r>
-            <a:endParaRPr lang="de-DE" sz="2800" dirty="0" smtClean="0"/>
           </a:p>
         </p:txBody>
       </p:sp>
@@ -7127,7 +7121,7 @@
   <p:timing>
     <p:tnLst>
       <p:par>
-        <p:cTn id="1" dur="indefinite" restart="never" nodeType="tmRoot"/>
+        <p:cTn xmlns:p14="http://schemas.microsoft.com/office/powerpoint/2010/main" id="1" dur="indefinite" restart="never" nodeType="tmRoot"/>
       </p:par>
     </p:tnLst>
   </p:timing>
@@ -7185,14 +7179,14 @@
             <a:noFill/>
           </a:ln>
           <a:extLst>
-            <a:ext uri="{909E8E84-426E-40DD-AFC4-6F175D3DCCD1}">
+            <a:ext uri="{909E8E84-426E-40dd-AFC4-6F175D3DCCD1}">
               <a14:hiddenFill xmlns:a14="http://schemas.microsoft.com/office/drawing/2010/main">
                 <a:solidFill>
                   <a:schemeClr val="accent1"/>
                 </a:solidFill>
               </a14:hiddenFill>
             </a:ext>
-            <a:ext uri="{91240B29-F687-4F45-9708-019B960494DF}">
+            <a:ext uri="{91240B29-F687-4f45-9708-019B960494DF}">
               <a14:hiddenLine xmlns:a14="http://schemas.microsoft.com/office/drawing/2010/main" w="9525">
                 <a:solidFill>
                   <a:schemeClr val="tx1"/>
@@ -7234,15 +7228,7 @@
                   <a:schemeClr val="bg1"/>
                 </a:solidFill>
               </a:rPr>
-              <a:t>  Fachlicher Überblick - </a:t>
-            </a:r>
-            <a:r>
-              <a:rPr lang="de-DE" sz="2800" dirty="0" smtClean="0">
-                <a:solidFill>
-                  <a:schemeClr val="bg1"/>
-                </a:solidFill>
-              </a:rPr>
-              <a:t>Anforderungen</a:t>
+              <a:t>  Fachlicher Überblick - Anforderungen</a:t>
             </a:r>
             <a:endParaRPr lang="de-DE" sz="2800" dirty="0">
               <a:solidFill>
@@ -7400,7 +7386,7 @@
   <p:timing>
     <p:tnLst>
       <p:par>
-        <p:cTn id="1" dur="indefinite" restart="never" nodeType="tmRoot"/>
+        <p:cTn xmlns:p14="http://schemas.microsoft.com/office/powerpoint/2010/main" id="1" dur="indefinite" restart="never" nodeType="tmRoot"/>
       </p:par>
     </p:tnLst>
   </p:timing>
@@ -7458,14 +7444,14 @@
             <a:noFill/>
           </a:ln>
           <a:extLst>
-            <a:ext uri="{909E8E84-426E-40DD-AFC4-6F175D3DCCD1}">
+            <a:ext uri="{909E8E84-426E-40dd-AFC4-6F175D3DCCD1}">
               <a14:hiddenFill xmlns:a14="http://schemas.microsoft.com/office/drawing/2010/main">
                 <a:solidFill>
                   <a:schemeClr val="accent1"/>
                 </a:solidFill>
               </a14:hiddenFill>
             </a:ext>
-            <a:ext uri="{91240B29-F687-4F45-9708-019B960494DF}">
+            <a:ext uri="{91240B29-F687-4f45-9708-019B960494DF}">
               <a14:hiddenLine xmlns:a14="http://schemas.microsoft.com/office/drawing/2010/main" w="9525">
                 <a:solidFill>
                   <a:schemeClr val="tx1"/>
@@ -7507,15 +7493,7 @@
                   <a:schemeClr val="bg1"/>
                 </a:solidFill>
               </a:rPr>
-              <a:t>  Fachlicher Überblick - </a:t>
-            </a:r>
-            <a:r>
-              <a:rPr lang="de-DE" sz="2800" dirty="0" smtClean="0">
-                <a:solidFill>
-                  <a:schemeClr val="bg1"/>
-                </a:solidFill>
-              </a:rPr>
-              <a:t>Anforderungen</a:t>
+              <a:t>  Fachlicher Überblick - Anforderungen</a:t>
             </a:r>
             <a:endParaRPr lang="de-DE" sz="2800" dirty="0">
               <a:solidFill>
@@ -7575,15 +7553,7 @@
             </a:pPr>
             <a:r>
               <a:rPr lang="de-DE" sz="2800" dirty="0" smtClean="0"/>
-              <a:t>Alle Daten werden in rel</a:t>
-            </a:r>
-            <a:r>
-              <a:rPr lang="de-DE" sz="2800" dirty="0" smtClean="0"/>
-              <a:t>ationaler</a:t>
-            </a:r>
-            <a:r>
-              <a:rPr lang="de-DE" sz="2800" dirty="0" smtClean="0"/>
-              <a:t> DB gespeichert</a:t>
+              <a:t>Alle Daten werden in relationaler DB gespeichert</a:t>
             </a:r>
           </a:p>
           <a:p>
@@ -7685,7 +7655,7 @@
   <p:timing>
     <p:tnLst>
       <p:par>
-        <p:cTn id="1" dur="indefinite" restart="never" nodeType="tmRoot"/>
+        <p:cTn xmlns:p14="http://schemas.microsoft.com/office/powerpoint/2010/main" id="1" dur="indefinite" restart="never" nodeType="tmRoot"/>
       </p:par>
     </p:tnLst>
   </p:timing>
@@ -7743,14 +7713,14 @@
             <a:noFill/>
           </a:ln>
           <a:extLst>
-            <a:ext uri="{909E8E84-426E-40DD-AFC4-6F175D3DCCD1}">
+            <a:ext uri="{909E8E84-426E-40dd-AFC4-6F175D3DCCD1}">
               <a14:hiddenFill xmlns:a14="http://schemas.microsoft.com/office/drawing/2010/main">
                 <a:solidFill>
                   <a:schemeClr val="accent1"/>
                 </a:solidFill>
               </a14:hiddenFill>
             </a:ext>
-            <a:ext uri="{91240B29-F687-4F45-9708-019B960494DF}">
+            <a:ext uri="{91240B29-F687-4f45-9708-019B960494DF}">
               <a14:hiddenLine xmlns:a14="http://schemas.microsoft.com/office/drawing/2010/main" w="9525">
                 <a:solidFill>
                   <a:schemeClr val="tx1"/>
@@ -7833,7 +7803,7 @@
           </a:prstGeom>
           <a:noFill/>
           <a:extLst>
-            <a:ext uri="{909E8E84-426E-40DD-AFC4-6F175D3DCCD1}">
+            <a:ext uri="{909E8E84-426E-40dd-AFC4-6F175D3DCCD1}">
               <a14:hiddenFill xmlns:a14="http://schemas.microsoft.com/office/drawing/2010/main">
                 <a:solidFill>
                   <a:srgbClr val="FFFFFF"/>
@@ -7856,7 +7826,7 @@
   <p:timing>
     <p:tnLst>
       <p:par>
-        <p:cTn id="1" dur="indefinite" restart="never" nodeType="tmRoot"/>
+        <p:cTn xmlns:p14="http://schemas.microsoft.com/office/powerpoint/2010/main" id="1" dur="indefinite" restart="never" nodeType="tmRoot"/>
       </p:par>
     </p:tnLst>
   </p:timing>
@@ -7914,14 +7884,14 @@
             <a:noFill/>
           </a:ln>
           <a:extLst>
-            <a:ext uri="{909E8E84-426E-40DD-AFC4-6F175D3DCCD1}">
+            <a:ext uri="{909E8E84-426E-40dd-AFC4-6F175D3DCCD1}">
               <a14:hiddenFill xmlns:a14="http://schemas.microsoft.com/office/drawing/2010/main">
                 <a:solidFill>
                   <a:schemeClr val="accent1"/>
                 </a:solidFill>
               </a14:hiddenFill>
             </a:ext>
-            <a:ext uri="{91240B29-F687-4F45-9708-019B960494DF}">
+            <a:ext uri="{91240B29-F687-4f45-9708-019B960494DF}">
               <a14:hiddenLine xmlns:a14="http://schemas.microsoft.com/office/drawing/2010/main" w="9525">
                 <a:solidFill>
                   <a:schemeClr val="tx1"/>
@@ -8025,7 +7995,7 @@
   <p:timing>
     <p:tnLst>
       <p:par>
-        <p:cTn id="1" dur="indefinite" restart="never" nodeType="tmRoot"/>
+        <p:cTn xmlns:p14="http://schemas.microsoft.com/office/powerpoint/2010/main" id="1" dur="indefinite" restart="never" nodeType="tmRoot"/>
       </p:par>
     </p:tnLst>
   </p:timing>
@@ -8083,14 +8053,14 @@
             <a:noFill/>
           </a:ln>
           <a:extLst>
-            <a:ext uri="{909E8E84-426E-40DD-AFC4-6F175D3DCCD1}">
+            <a:ext uri="{909E8E84-426E-40dd-AFC4-6F175D3DCCD1}">
               <a14:hiddenFill xmlns:a14="http://schemas.microsoft.com/office/drawing/2010/main">
                 <a:solidFill>
                   <a:schemeClr val="accent1"/>
                 </a:solidFill>
               </a14:hiddenFill>
             </a:ext>
-            <a:ext uri="{91240B29-F687-4F45-9708-019B960494DF}">
+            <a:ext uri="{91240B29-F687-4f45-9708-019B960494DF}">
               <a14:hiddenLine xmlns:a14="http://schemas.microsoft.com/office/drawing/2010/main" w="9525">
                 <a:solidFill>
                   <a:schemeClr val="tx1"/>
@@ -8171,7 +8141,7 @@
           </a:prstGeom>
           <a:noFill/>
           <a:extLst>
-            <a:ext uri="{909E8E84-426E-40DD-AFC4-6F175D3DCCD1}">
+            <a:ext uri="{909E8E84-426E-40dd-AFC4-6F175D3DCCD1}">
               <a14:hiddenFill xmlns:a14="http://schemas.microsoft.com/office/drawing/2010/main">
                 <a:solidFill>
                   <a:srgbClr val="FFFFFF"/>
@@ -8318,7 +8288,7 @@
   <p:timing>
     <p:tnLst>
       <p:par>
-        <p:cTn id="1" dur="indefinite" restart="never" nodeType="tmRoot"/>
+        <p:cTn xmlns:p14="http://schemas.microsoft.com/office/powerpoint/2010/main" id="1" dur="indefinite" restart="never" nodeType="tmRoot"/>
       </p:par>
     </p:tnLst>
   </p:timing>
@@ -8376,14 +8346,14 @@
             <a:noFill/>
           </a:ln>
           <a:extLst>
-            <a:ext uri="{909E8E84-426E-40DD-AFC4-6F175D3DCCD1}">
+            <a:ext uri="{909E8E84-426E-40dd-AFC4-6F175D3DCCD1}">
               <a14:hiddenFill xmlns:a14="http://schemas.microsoft.com/office/drawing/2010/main">
                 <a:solidFill>
                   <a:schemeClr val="accent1"/>
                 </a:solidFill>
               </a14:hiddenFill>
             </a:ext>
-            <a:ext uri="{91240B29-F687-4F45-9708-019B960494DF}">
+            <a:ext uri="{91240B29-F687-4f45-9708-019B960494DF}">
               <a14:hiddenLine xmlns:a14="http://schemas.microsoft.com/office/drawing/2010/main" w="9525">
                 <a:solidFill>
                   <a:schemeClr val="tx1"/>
@@ -8467,14 +8437,14 @@
             <a:noFill/>
           </a:ln>
           <a:extLst>
-            <a:ext uri="{909E8E84-426E-40DD-AFC4-6F175D3DCCD1}">
+            <a:ext uri="{909E8E84-426E-40dd-AFC4-6F175D3DCCD1}">
               <a14:hiddenFill xmlns:a14="http://schemas.microsoft.com/office/drawing/2010/main">
                 <a:solidFill>
                   <a:schemeClr val="accent1"/>
                 </a:solidFill>
               </a14:hiddenFill>
             </a:ext>
-            <a:ext uri="{91240B29-F687-4F45-9708-019B960494DF}">
+            <a:ext uri="{91240B29-F687-4f45-9708-019B960494DF}">
               <a14:hiddenLine xmlns:a14="http://schemas.microsoft.com/office/drawing/2010/main" w="9525">
                 <a:solidFill>
                   <a:schemeClr val="tx1"/>
@@ -8668,7 +8638,7 @@
   <p:timing>
     <p:tnLst>
       <p:par>
-        <p:cTn id="1" dur="indefinite" restart="never" nodeType="tmRoot"/>
+        <p:cTn xmlns:p14="http://schemas.microsoft.com/office/powerpoint/2010/main" id="1" dur="indefinite" restart="never" nodeType="tmRoot"/>
       </p:par>
     </p:tnLst>
   </p:timing>
@@ -8726,14 +8696,14 @@
             <a:noFill/>
           </a:ln>
           <a:extLst>
-            <a:ext uri="{909E8E84-426E-40DD-AFC4-6F175D3DCCD1}">
+            <a:ext uri="{909E8E84-426E-40dd-AFC4-6F175D3DCCD1}">
               <a14:hiddenFill xmlns:a14="http://schemas.microsoft.com/office/drawing/2010/main">
                 <a:solidFill>
                   <a:schemeClr val="accent1"/>
                 </a:solidFill>
               </a14:hiddenFill>
             </a:ext>
-            <a:ext uri="{91240B29-F687-4F45-9708-019B960494DF}">
+            <a:ext uri="{91240B29-F687-4f45-9708-019B960494DF}">
               <a14:hiddenLine xmlns:a14="http://schemas.microsoft.com/office/drawing/2010/main" w="9525">
                 <a:solidFill>
                   <a:schemeClr val="tx1"/>
@@ -8817,14 +8787,14 @@
             <a:noFill/>
           </a:ln>
           <a:extLst>
-            <a:ext uri="{909E8E84-426E-40DD-AFC4-6F175D3DCCD1}">
+            <a:ext uri="{909E8E84-426E-40dd-AFC4-6F175D3DCCD1}">
               <a14:hiddenFill xmlns:a14="http://schemas.microsoft.com/office/drawing/2010/main">
                 <a:solidFill>
                   <a:schemeClr val="accent1"/>
                 </a:solidFill>
               </a14:hiddenFill>
             </a:ext>
-            <a:ext uri="{91240B29-F687-4F45-9708-019B960494DF}">
+            <a:ext uri="{91240B29-F687-4f45-9708-019B960494DF}">
               <a14:hiddenLine xmlns:a14="http://schemas.microsoft.com/office/drawing/2010/main" w="9525">
                 <a:solidFill>
                   <a:schemeClr val="tx1"/>
@@ -9027,7 +8997,7 @@
   <p:timing>
     <p:tnLst>
       <p:par>
-        <p:cTn id="1" dur="indefinite" restart="never" nodeType="tmRoot"/>
+        <p:cTn xmlns:p14="http://schemas.microsoft.com/office/powerpoint/2010/main" id="1" dur="indefinite" restart="never" nodeType="tmRoot"/>
       </p:par>
     </p:tnLst>
   </p:timing>
@@ -9085,14 +9055,14 @@
             <a:noFill/>
           </a:ln>
           <a:extLst>
-            <a:ext uri="{909E8E84-426E-40DD-AFC4-6F175D3DCCD1}">
+            <a:ext uri="{909E8E84-426E-40dd-AFC4-6F175D3DCCD1}">
               <a14:hiddenFill xmlns:a14="http://schemas.microsoft.com/office/drawing/2010/main">
                 <a:solidFill>
                   <a:schemeClr val="accent1"/>
                 </a:solidFill>
               </a14:hiddenFill>
             </a:ext>
-            <a:ext uri="{91240B29-F687-4F45-9708-019B960494DF}">
+            <a:ext uri="{91240B29-F687-4f45-9708-019B960494DF}">
               <a14:hiddenLine xmlns:a14="http://schemas.microsoft.com/office/drawing/2010/main" w="9525">
                 <a:solidFill>
                   <a:schemeClr val="tx1"/>
@@ -9176,14 +9146,14 @@
             <a:noFill/>
           </a:ln>
           <a:extLst>
-            <a:ext uri="{909E8E84-426E-40DD-AFC4-6F175D3DCCD1}">
+            <a:ext uri="{909E8E84-426E-40dd-AFC4-6F175D3DCCD1}">
               <a14:hiddenFill xmlns:a14="http://schemas.microsoft.com/office/drawing/2010/main">
                 <a:solidFill>
                   <a:schemeClr val="accent1"/>
                 </a:solidFill>
               </a14:hiddenFill>
             </a:ext>
-            <a:ext uri="{91240B29-F687-4F45-9708-019B960494DF}">
+            <a:ext uri="{91240B29-F687-4f45-9708-019B960494DF}">
               <a14:hiddenLine xmlns:a14="http://schemas.microsoft.com/office/drawing/2010/main" w="9525">
                 <a:solidFill>
                   <a:schemeClr val="tx1"/>
@@ -9387,7 +9357,7 @@
   <p:timing>
     <p:tnLst>
       <p:par>
-        <p:cTn id="1" dur="indefinite" restart="never" nodeType="tmRoot"/>
+        <p:cTn xmlns:p14="http://schemas.microsoft.com/office/powerpoint/2010/main" id="1" dur="indefinite" restart="never" nodeType="tmRoot"/>
       </p:par>
     </p:tnLst>
   </p:timing>
@@ -9445,14 +9415,14 @@
             <a:noFill/>
           </a:ln>
           <a:extLst>
-            <a:ext uri="{909E8E84-426E-40DD-AFC4-6F175D3DCCD1}">
+            <a:ext uri="{909E8E84-426E-40dd-AFC4-6F175D3DCCD1}">
               <a14:hiddenFill xmlns:a14="http://schemas.microsoft.com/office/drawing/2010/main">
                 <a:solidFill>
                   <a:schemeClr val="accent1"/>
                 </a:solidFill>
               </a14:hiddenFill>
             </a:ext>
-            <a:ext uri="{91240B29-F687-4F45-9708-019B960494DF}">
+            <a:ext uri="{91240B29-F687-4f45-9708-019B960494DF}">
               <a14:hiddenLine xmlns:a14="http://schemas.microsoft.com/office/drawing/2010/main" w="9525">
                 <a:solidFill>
                   <a:schemeClr val="tx1"/>
@@ -9536,14 +9506,14 @@
             <a:noFill/>
           </a:ln>
           <a:extLst>
-            <a:ext uri="{909E8E84-426E-40DD-AFC4-6F175D3DCCD1}">
+            <a:ext uri="{909E8E84-426E-40dd-AFC4-6F175D3DCCD1}">
               <a14:hiddenFill xmlns:a14="http://schemas.microsoft.com/office/drawing/2010/main">
                 <a:solidFill>
                   <a:schemeClr val="accent1"/>
                 </a:solidFill>
               </a14:hiddenFill>
             </a:ext>
-            <a:ext uri="{91240B29-F687-4F45-9708-019B960494DF}">
+            <a:ext uri="{91240B29-F687-4f45-9708-019B960494DF}">
               <a14:hiddenLine xmlns:a14="http://schemas.microsoft.com/office/drawing/2010/main" w="9525">
                 <a:solidFill>
                   <a:schemeClr val="tx1"/>
@@ -9740,7 +9710,7 @@
   <p:timing>
     <p:tnLst>
       <p:par>
-        <p:cTn id="1" dur="indefinite" restart="never" nodeType="tmRoot"/>
+        <p:cTn xmlns:p14="http://schemas.microsoft.com/office/powerpoint/2010/main" id="1" dur="indefinite" restart="never" nodeType="tmRoot"/>
       </p:par>
     </p:tnLst>
   </p:timing>
@@ -9798,14 +9768,14 @@
             <a:noFill/>
           </a:ln>
           <a:extLst>
-            <a:ext uri="{909E8E84-426E-40DD-AFC4-6F175D3DCCD1}">
+            <a:ext uri="{909E8E84-426E-40dd-AFC4-6F175D3DCCD1}">
               <a14:hiddenFill xmlns:a14="http://schemas.microsoft.com/office/drawing/2010/main">
                 <a:solidFill>
                   <a:schemeClr val="accent1"/>
                 </a:solidFill>
               </a14:hiddenFill>
             </a:ext>
-            <a:ext uri="{91240B29-F687-4F45-9708-019B960494DF}">
+            <a:ext uri="{91240B29-F687-4f45-9708-019B960494DF}">
               <a14:hiddenLine xmlns:a14="http://schemas.microsoft.com/office/drawing/2010/main" w="9525">
                 <a:solidFill>
                   <a:schemeClr val="tx1"/>
@@ -10044,7 +10014,7 @@
   <p:timing>
     <p:tnLst>
       <p:par>
-        <p:cTn id="1" dur="indefinite" restart="never" nodeType="tmRoot"/>
+        <p:cTn xmlns:p14="http://schemas.microsoft.com/office/powerpoint/2010/main" id="1" dur="indefinite" restart="never" nodeType="tmRoot"/>
       </p:par>
     </p:tnLst>
   </p:timing>
@@ -10102,14 +10072,14 @@
             <a:noFill/>
           </a:ln>
           <a:extLst>
-            <a:ext uri="{909E8E84-426E-40DD-AFC4-6F175D3DCCD1}">
+            <a:ext uri="{909E8E84-426E-40dd-AFC4-6F175D3DCCD1}">
               <a14:hiddenFill xmlns:a14="http://schemas.microsoft.com/office/drawing/2010/main">
                 <a:solidFill>
                   <a:schemeClr val="accent1"/>
                 </a:solidFill>
               </a14:hiddenFill>
             </a:ext>
-            <a:ext uri="{91240B29-F687-4F45-9708-019B960494DF}">
+            <a:ext uri="{91240B29-F687-4f45-9708-019B960494DF}">
               <a14:hiddenLine xmlns:a14="http://schemas.microsoft.com/office/drawing/2010/main" w="9525">
                 <a:solidFill>
                   <a:schemeClr val="tx1"/>
@@ -10338,7 +10308,7 @@
   <p:timing>
     <p:tnLst>
       <p:par>
-        <p:cTn id="1" dur="indefinite" restart="never" nodeType="tmRoot"/>
+        <p:cTn xmlns:p14="http://schemas.microsoft.com/office/powerpoint/2010/main" id="1" dur="indefinite" restart="never" nodeType="tmRoot"/>
       </p:par>
     </p:tnLst>
   </p:timing>

</xml_diff>

<commit_message>
Präsi 1 final + Notizen
</commit_message>
<xml_diff>
--- a/Doku/Praesi1.pptx
+++ b/Doku/Praesi1.pptx
@@ -311,7 +311,7 @@
           <a:p>
             <a:fld id="{CF2933F3-F04D-48C8-9880-7A8EA4FF7473}" type="datetimeFigureOut">
               <a:rPr lang="de-DE" smtClean="0"/>
-              <a:t>12.11.14</a:t>
+              <a:t>12.11.2014</a:t>
             </a:fld>
             <a:endParaRPr lang="de-DE"/>
           </a:p>
@@ -481,7 +481,7 @@
           <a:p>
             <a:fld id="{CF2933F3-F04D-48C8-9880-7A8EA4FF7473}" type="datetimeFigureOut">
               <a:rPr lang="de-DE" smtClean="0"/>
-              <a:t>12.11.14</a:t>
+              <a:t>12.11.2014</a:t>
             </a:fld>
             <a:endParaRPr lang="de-DE"/>
           </a:p>
@@ -661,7 +661,7 @@
           <a:p>
             <a:fld id="{CF2933F3-F04D-48C8-9880-7A8EA4FF7473}" type="datetimeFigureOut">
               <a:rPr lang="de-DE" smtClean="0"/>
-              <a:t>12.11.14</a:t>
+              <a:t>12.11.2014</a:t>
             </a:fld>
             <a:endParaRPr lang="de-DE"/>
           </a:p>
@@ -831,7 +831,7 @@
           <a:p>
             <a:fld id="{CF2933F3-F04D-48C8-9880-7A8EA4FF7473}" type="datetimeFigureOut">
               <a:rPr lang="de-DE" smtClean="0"/>
-              <a:t>12.11.14</a:t>
+              <a:t>12.11.2014</a:t>
             </a:fld>
             <a:endParaRPr lang="de-DE"/>
           </a:p>
@@ -1077,7 +1077,7 @@
           <a:p>
             <a:fld id="{CF2933F3-F04D-48C8-9880-7A8EA4FF7473}" type="datetimeFigureOut">
               <a:rPr lang="de-DE" smtClean="0"/>
-              <a:t>12.11.14</a:t>
+              <a:t>12.11.2014</a:t>
             </a:fld>
             <a:endParaRPr lang="de-DE"/>
           </a:p>
@@ -1365,7 +1365,7 @@
           <a:p>
             <a:fld id="{CF2933F3-F04D-48C8-9880-7A8EA4FF7473}" type="datetimeFigureOut">
               <a:rPr lang="de-DE" smtClean="0"/>
-              <a:t>12.11.14</a:t>
+              <a:t>12.11.2014</a:t>
             </a:fld>
             <a:endParaRPr lang="de-DE"/>
           </a:p>
@@ -1787,7 +1787,7 @@
           <a:p>
             <a:fld id="{CF2933F3-F04D-48C8-9880-7A8EA4FF7473}" type="datetimeFigureOut">
               <a:rPr lang="de-DE" smtClean="0"/>
-              <a:t>12.11.14</a:t>
+              <a:t>12.11.2014</a:t>
             </a:fld>
             <a:endParaRPr lang="de-DE"/>
           </a:p>
@@ -1905,7 +1905,7 @@
           <a:p>
             <a:fld id="{CF2933F3-F04D-48C8-9880-7A8EA4FF7473}" type="datetimeFigureOut">
               <a:rPr lang="de-DE" smtClean="0"/>
-              <a:t>12.11.14</a:t>
+              <a:t>12.11.2014</a:t>
             </a:fld>
             <a:endParaRPr lang="de-DE"/>
           </a:p>
@@ -2000,7 +2000,7 @@
           <a:p>
             <a:fld id="{CF2933F3-F04D-48C8-9880-7A8EA4FF7473}" type="datetimeFigureOut">
               <a:rPr lang="de-DE" smtClean="0"/>
-              <a:t>12.11.14</a:t>
+              <a:t>12.11.2014</a:t>
             </a:fld>
             <a:endParaRPr lang="de-DE"/>
           </a:p>
@@ -2277,7 +2277,7 @@
           <a:p>
             <a:fld id="{CF2933F3-F04D-48C8-9880-7A8EA4FF7473}" type="datetimeFigureOut">
               <a:rPr lang="de-DE" smtClean="0"/>
-              <a:t>12.11.14</a:t>
+              <a:t>12.11.2014</a:t>
             </a:fld>
             <a:endParaRPr lang="de-DE"/>
           </a:p>
@@ -2530,7 +2530,7 @@
           <a:p>
             <a:fld id="{CF2933F3-F04D-48C8-9880-7A8EA4FF7473}" type="datetimeFigureOut">
               <a:rPr lang="de-DE" smtClean="0"/>
-              <a:t>12.11.14</a:t>
+              <a:t>12.11.2014</a:t>
             </a:fld>
             <a:endParaRPr lang="de-DE"/>
           </a:p>
@@ -2743,7 +2743,7 @@
           <a:p>
             <a:fld id="{CF2933F3-F04D-48C8-9880-7A8EA4FF7473}" type="datetimeFigureOut">
               <a:rPr lang="de-DE" smtClean="0"/>
-              <a:t>12.11.14</a:t>
+              <a:t>12.11.2014</a:t>
             </a:fld>
             <a:endParaRPr lang="de-DE"/>
           </a:p>
@@ -3152,14 +3152,14 @@
             <a:noFill/>
           </a:ln>
           <a:extLst>
-            <a:ext uri="{909E8E84-426E-40dd-AFC4-6F175D3DCCD1}">
+            <a:ext uri="{909E8E84-426E-40DD-AFC4-6F175D3DCCD1}">
               <a14:hiddenFill xmlns:a14="http://schemas.microsoft.com/office/drawing/2010/main">
                 <a:solidFill>
                   <a:schemeClr val="accent1"/>
                 </a:solidFill>
               </a14:hiddenFill>
             </a:ext>
-            <a:ext uri="{91240B29-F687-4f45-9708-019B960494DF}">
+            <a:ext uri="{91240B29-F687-4F45-9708-019B960494DF}">
               <a14:hiddenLine xmlns:a14="http://schemas.microsoft.com/office/drawing/2010/main" w="9525">
                 <a:solidFill>
                   <a:schemeClr val="tx1"/>
@@ -3256,14 +3256,14 @@
             <a:noFill/>
           </a:ln>
           <a:extLst>
-            <a:ext uri="{909E8E84-426E-40dd-AFC4-6F175D3DCCD1}">
+            <a:ext uri="{909E8E84-426E-40DD-AFC4-6F175D3DCCD1}">
               <a14:hiddenFill xmlns:a14="http://schemas.microsoft.com/office/drawing/2010/main">
                 <a:solidFill>
                   <a:schemeClr val="accent1"/>
                 </a:solidFill>
               </a14:hiddenFill>
             </a:ext>
-            <a:ext uri="{91240B29-F687-4f45-9708-019B960494DF}">
+            <a:ext uri="{91240B29-F687-4F45-9708-019B960494DF}">
               <a14:hiddenLine xmlns:a14="http://schemas.microsoft.com/office/drawing/2010/main" w="9525">
                 <a:solidFill>
                   <a:schemeClr val="tx1"/>
@@ -3311,14 +3311,14 @@
           </a:ln>
           <a:effectLst/>
           <a:extLst>
-            <a:ext uri="{909E8E84-426E-40dd-AFC4-6F175D3DCCD1}">
+            <a:ext uri="{909E8E84-426E-40DD-AFC4-6F175D3DCCD1}">
               <a14:hiddenFill xmlns:a14="http://schemas.microsoft.com/office/drawing/2010/main">
                 <a:solidFill>
                   <a:schemeClr val="accent1"/>
                 </a:solidFill>
               </a14:hiddenFill>
             </a:ext>
-            <a:ext uri="{91240B29-F687-4f45-9708-019B960494DF}">
+            <a:ext uri="{91240B29-F687-4F45-9708-019B960494DF}">
               <a14:hiddenLine xmlns:a14="http://schemas.microsoft.com/office/drawing/2010/main" w="9525">
                 <a:solidFill>
                   <a:schemeClr val="tx1"/>
@@ -3328,7 +3328,7 @@
                 <a:tailEnd/>
               </a14:hiddenLine>
             </a:ext>
-            <a:ext uri="{AF507438-7753-43e0-B8FC-AC1667EBCBE1}">
+            <a:ext uri="{AF507438-7753-43E0-B8FC-AC1667EBCBE1}">
               <a14:hiddenEffects xmlns:a14="http://schemas.microsoft.com/office/drawing/2010/main">
                 <a:effectLst>
                   <a:outerShdw dist="35921" dir="2700000" algn="ctr" rotWithShape="0">
@@ -3412,7 +3412,7 @@
   <p:timing>
     <p:tnLst>
       <p:par>
-        <p:cTn xmlns:p14="http://schemas.microsoft.com/office/powerpoint/2010/main" id="1" dur="indefinite" restart="never" nodeType="tmRoot"/>
+        <p:cTn id="1" dur="indefinite" restart="never" nodeType="tmRoot"/>
       </p:par>
     </p:tnLst>
   </p:timing>
@@ -3470,14 +3470,14 @@
             <a:noFill/>
           </a:ln>
           <a:extLst>
-            <a:ext uri="{909E8E84-426E-40dd-AFC4-6F175D3DCCD1}">
+            <a:ext uri="{909E8E84-426E-40DD-AFC4-6F175D3DCCD1}">
               <a14:hiddenFill xmlns:a14="http://schemas.microsoft.com/office/drawing/2010/main">
                 <a:solidFill>
                   <a:schemeClr val="accent1"/>
                 </a:solidFill>
               </a14:hiddenFill>
             </a:ext>
-            <a:ext uri="{91240B29-F687-4f45-9708-019B960494DF}">
+            <a:ext uri="{91240B29-F687-4F45-9708-019B960494DF}">
               <a14:hiddenLine xmlns:a14="http://schemas.microsoft.com/office/drawing/2010/main" w="9525">
                 <a:solidFill>
                   <a:schemeClr val="tx1"/>
@@ -3696,7 +3696,7 @@
   <p:timing>
     <p:tnLst>
       <p:par>
-        <p:cTn xmlns:p14="http://schemas.microsoft.com/office/powerpoint/2010/main" id="1" dur="indefinite" restart="never" nodeType="tmRoot"/>
+        <p:cTn id="1" dur="indefinite" restart="never" nodeType="tmRoot"/>
       </p:par>
     </p:tnLst>
   </p:timing>
@@ -3754,14 +3754,14 @@
             <a:noFill/>
           </a:ln>
           <a:extLst>
-            <a:ext uri="{909E8E84-426E-40dd-AFC4-6F175D3DCCD1}">
+            <a:ext uri="{909E8E84-426E-40DD-AFC4-6F175D3DCCD1}">
               <a14:hiddenFill xmlns:a14="http://schemas.microsoft.com/office/drawing/2010/main">
                 <a:solidFill>
                   <a:schemeClr val="accent1"/>
                 </a:solidFill>
               </a14:hiddenFill>
             </a:ext>
-            <a:ext uri="{91240B29-F687-4f45-9708-019B960494DF}">
+            <a:ext uri="{91240B29-F687-4F45-9708-019B960494DF}">
               <a14:hiddenLine xmlns:a14="http://schemas.microsoft.com/office/drawing/2010/main" w="9525">
                 <a:solidFill>
                   <a:schemeClr val="tx1"/>
@@ -4020,7 +4020,7 @@
   <p:timing>
     <p:tnLst>
       <p:par>
-        <p:cTn xmlns:p14="http://schemas.microsoft.com/office/powerpoint/2010/main" id="1" dur="indefinite" restart="never" nodeType="tmRoot"/>
+        <p:cTn id="1" dur="indefinite" restart="never" nodeType="tmRoot"/>
       </p:par>
     </p:tnLst>
   </p:timing>
@@ -4078,14 +4078,14 @@
             <a:noFill/>
           </a:ln>
           <a:extLst>
-            <a:ext uri="{909E8E84-426E-40dd-AFC4-6F175D3DCCD1}">
+            <a:ext uri="{909E8E84-426E-40DD-AFC4-6F175D3DCCD1}">
               <a14:hiddenFill xmlns:a14="http://schemas.microsoft.com/office/drawing/2010/main">
                 <a:solidFill>
                   <a:schemeClr val="accent1"/>
                 </a:solidFill>
               </a14:hiddenFill>
             </a:ext>
-            <a:ext uri="{91240B29-F687-4f45-9708-019B960494DF}">
+            <a:ext uri="{91240B29-F687-4F45-9708-019B960494DF}">
               <a14:hiddenLine xmlns:a14="http://schemas.microsoft.com/office/drawing/2010/main" w="9525">
                 <a:solidFill>
                   <a:schemeClr val="tx1"/>
@@ -4304,7 +4304,7 @@
   <p:timing>
     <p:tnLst>
       <p:par>
-        <p:cTn xmlns:p14="http://schemas.microsoft.com/office/powerpoint/2010/main" id="1" dur="indefinite" restart="never" nodeType="tmRoot"/>
+        <p:cTn id="1" dur="indefinite" restart="never" nodeType="tmRoot"/>
       </p:par>
     </p:tnLst>
   </p:timing>
@@ -4362,14 +4362,14 @@
             <a:noFill/>
           </a:ln>
           <a:extLst>
-            <a:ext uri="{909E8E84-426E-40dd-AFC4-6F175D3DCCD1}">
+            <a:ext uri="{909E8E84-426E-40DD-AFC4-6F175D3DCCD1}">
               <a14:hiddenFill xmlns:a14="http://schemas.microsoft.com/office/drawing/2010/main">
                 <a:solidFill>
                   <a:schemeClr val="accent1"/>
                 </a:solidFill>
               </a14:hiddenFill>
             </a:ext>
-            <a:ext uri="{91240B29-F687-4f45-9708-019B960494DF}">
+            <a:ext uri="{91240B29-F687-4F45-9708-019B960494DF}">
               <a14:hiddenLine xmlns:a14="http://schemas.microsoft.com/office/drawing/2010/main" w="9525">
                 <a:solidFill>
                   <a:schemeClr val="tx1"/>
@@ -4608,7 +4608,7 @@
   <p:timing>
     <p:tnLst>
       <p:par>
-        <p:cTn xmlns:p14="http://schemas.microsoft.com/office/powerpoint/2010/main" id="1" dur="indefinite" restart="never" nodeType="tmRoot"/>
+        <p:cTn id="1" dur="indefinite" restart="never" nodeType="tmRoot"/>
       </p:par>
     </p:tnLst>
   </p:timing>
@@ -4666,14 +4666,14 @@
             <a:noFill/>
           </a:ln>
           <a:extLst>
-            <a:ext uri="{909E8E84-426E-40dd-AFC4-6F175D3DCCD1}">
+            <a:ext uri="{909E8E84-426E-40DD-AFC4-6F175D3DCCD1}">
               <a14:hiddenFill xmlns:a14="http://schemas.microsoft.com/office/drawing/2010/main">
                 <a:solidFill>
                   <a:schemeClr val="accent1"/>
                 </a:solidFill>
               </a14:hiddenFill>
             </a:ext>
-            <a:ext uri="{91240B29-F687-4f45-9708-019B960494DF}">
+            <a:ext uri="{91240B29-F687-4F45-9708-019B960494DF}">
               <a14:hiddenLine xmlns:a14="http://schemas.microsoft.com/office/drawing/2010/main" w="9525">
                 <a:solidFill>
                   <a:schemeClr val="tx1"/>
@@ -4912,7 +4912,7 @@
   <p:timing>
     <p:tnLst>
       <p:par>
-        <p:cTn xmlns:p14="http://schemas.microsoft.com/office/powerpoint/2010/main" id="1" dur="indefinite" restart="never" nodeType="tmRoot"/>
+        <p:cTn id="1" dur="indefinite" restart="never" nodeType="tmRoot"/>
       </p:par>
     </p:tnLst>
   </p:timing>
@@ -4970,14 +4970,14 @@
             <a:noFill/>
           </a:ln>
           <a:extLst>
-            <a:ext uri="{909E8E84-426E-40dd-AFC4-6F175D3DCCD1}">
+            <a:ext uri="{909E8E84-426E-40DD-AFC4-6F175D3DCCD1}">
               <a14:hiddenFill xmlns:a14="http://schemas.microsoft.com/office/drawing/2010/main">
                 <a:solidFill>
                   <a:schemeClr val="accent1"/>
                 </a:solidFill>
               </a14:hiddenFill>
             </a:ext>
-            <a:ext uri="{91240B29-F687-4f45-9708-019B960494DF}">
+            <a:ext uri="{91240B29-F687-4F45-9708-019B960494DF}">
               <a14:hiddenLine xmlns:a14="http://schemas.microsoft.com/office/drawing/2010/main" w="9525">
                 <a:solidFill>
                   <a:schemeClr val="tx1"/>
@@ -5209,7 +5209,7 @@
   <p:timing>
     <p:tnLst>
       <p:par>
-        <p:cTn xmlns:p14="http://schemas.microsoft.com/office/powerpoint/2010/main" id="1" dur="indefinite" restart="never" nodeType="tmRoot"/>
+        <p:cTn id="1" dur="indefinite" restart="never" nodeType="tmRoot"/>
       </p:par>
     </p:tnLst>
   </p:timing>
@@ -5267,14 +5267,14 @@
             <a:noFill/>
           </a:ln>
           <a:extLst>
-            <a:ext uri="{909E8E84-426E-40dd-AFC4-6F175D3DCCD1}">
+            <a:ext uri="{909E8E84-426E-40DD-AFC4-6F175D3DCCD1}">
               <a14:hiddenFill xmlns:a14="http://schemas.microsoft.com/office/drawing/2010/main">
                 <a:solidFill>
                   <a:schemeClr val="accent1"/>
                 </a:solidFill>
               </a14:hiddenFill>
             </a:ext>
-            <a:ext uri="{91240B29-F687-4f45-9708-019B960494DF}">
+            <a:ext uri="{91240B29-F687-4F45-9708-019B960494DF}">
               <a14:hiddenLine xmlns:a14="http://schemas.microsoft.com/office/drawing/2010/main" w="9525">
                 <a:solidFill>
                   <a:schemeClr val="tx1"/>
@@ -5495,7 +5495,7 @@
   <p:timing>
     <p:tnLst>
       <p:par>
-        <p:cTn xmlns:p14="http://schemas.microsoft.com/office/powerpoint/2010/main" id="1" dur="indefinite" restart="never" nodeType="tmRoot"/>
+        <p:cTn id="1" dur="indefinite" restart="never" nodeType="tmRoot"/>
       </p:par>
     </p:tnLst>
   </p:timing>
@@ -5553,14 +5553,14 @@
             <a:noFill/>
           </a:ln>
           <a:extLst>
-            <a:ext uri="{909E8E84-426E-40dd-AFC4-6F175D3DCCD1}">
+            <a:ext uri="{909E8E84-426E-40DD-AFC4-6F175D3DCCD1}">
               <a14:hiddenFill xmlns:a14="http://schemas.microsoft.com/office/drawing/2010/main">
                 <a:solidFill>
                   <a:schemeClr val="accent1"/>
                 </a:solidFill>
               </a14:hiddenFill>
             </a:ext>
-            <a:ext uri="{91240B29-F687-4f45-9708-019B960494DF}">
+            <a:ext uri="{91240B29-F687-4F45-9708-019B960494DF}">
               <a14:hiddenLine xmlns:a14="http://schemas.microsoft.com/office/drawing/2010/main" w="9525">
                 <a:solidFill>
                   <a:schemeClr val="tx1"/>
@@ -5644,14 +5644,14 @@
             <a:noFill/>
           </a:ln>
           <a:extLst>
-            <a:ext uri="{909E8E84-426E-40dd-AFC4-6F175D3DCCD1}">
+            <a:ext uri="{909E8E84-426E-40DD-AFC4-6F175D3DCCD1}">
               <a14:hiddenFill xmlns:a14="http://schemas.microsoft.com/office/drawing/2010/main">
                 <a:solidFill>
                   <a:schemeClr val="accent1"/>
                 </a:solidFill>
               </a14:hiddenFill>
             </a:ext>
-            <a:ext uri="{91240B29-F687-4f45-9708-019B960494DF}">
+            <a:ext uri="{91240B29-F687-4F45-9708-019B960494DF}">
               <a14:hiddenLine xmlns:a14="http://schemas.microsoft.com/office/drawing/2010/main" w="9525">
                 <a:solidFill>
                   <a:schemeClr val="tx1"/>
@@ -5677,7 +5677,7 @@
   <p:timing>
     <p:tnLst>
       <p:par>
-        <p:cTn xmlns:p14="http://schemas.microsoft.com/office/powerpoint/2010/main" id="1" dur="indefinite" restart="never" nodeType="tmRoot"/>
+        <p:cTn id="1" dur="indefinite" restart="never" nodeType="tmRoot"/>
       </p:par>
     </p:tnLst>
   </p:timing>
@@ -5735,14 +5735,14 @@
             <a:noFill/>
           </a:ln>
           <a:extLst>
-            <a:ext uri="{909E8E84-426E-40dd-AFC4-6F175D3DCCD1}">
+            <a:ext uri="{909E8E84-426E-40DD-AFC4-6F175D3DCCD1}">
               <a14:hiddenFill xmlns:a14="http://schemas.microsoft.com/office/drawing/2010/main">
                 <a:solidFill>
                   <a:schemeClr val="accent1"/>
                 </a:solidFill>
               </a14:hiddenFill>
             </a:ext>
-            <a:ext uri="{91240B29-F687-4f45-9708-019B960494DF}">
+            <a:ext uri="{91240B29-F687-4F45-9708-019B960494DF}">
               <a14:hiddenLine xmlns:a14="http://schemas.microsoft.com/office/drawing/2010/main" w="9525">
                 <a:solidFill>
                   <a:schemeClr val="tx1"/>
@@ -6009,7 +6009,7 @@
   <p:timing>
     <p:tnLst>
       <p:par>
-        <p:cTn xmlns:p14="http://schemas.microsoft.com/office/powerpoint/2010/main" id="1" dur="indefinite" restart="never" nodeType="tmRoot"/>
+        <p:cTn id="1" dur="indefinite" restart="never" nodeType="tmRoot"/>
       </p:par>
     </p:tnLst>
   </p:timing>
@@ -6067,14 +6067,14 @@
             <a:noFill/>
           </a:ln>
           <a:extLst>
-            <a:ext uri="{909E8E84-426E-40dd-AFC4-6F175D3DCCD1}">
+            <a:ext uri="{909E8E84-426E-40DD-AFC4-6F175D3DCCD1}">
               <a14:hiddenFill xmlns:a14="http://schemas.microsoft.com/office/drawing/2010/main">
                 <a:solidFill>
                   <a:schemeClr val="accent1"/>
                 </a:solidFill>
               </a14:hiddenFill>
             </a:ext>
-            <a:ext uri="{91240B29-F687-4f45-9708-019B960494DF}">
+            <a:ext uri="{91240B29-F687-4F45-9708-019B960494DF}">
               <a14:hiddenLine xmlns:a14="http://schemas.microsoft.com/office/drawing/2010/main" w="9525">
                 <a:solidFill>
                   <a:schemeClr val="tx1"/>
@@ -6188,11 +6188,7 @@
             </a:r>
             <a:r>
               <a:rPr lang="de-DE" sz="2800" smtClean="0"/>
-              <a:t>zum </a:t>
-            </a:r>
-            <a:r>
-              <a:rPr lang="de-DE" sz="2800" smtClean="0"/>
-              <a:t>	Dozent</a:t>
+              <a:t>zum 	Dozent</a:t>
             </a:r>
             <a:endParaRPr lang="de-DE" sz="2800" b="1" dirty="0" smtClean="0">
               <a:solidFill>
@@ -6339,7 +6335,7 @@
   <p:timing>
     <p:tnLst>
       <p:par>
-        <p:cTn xmlns:p14="http://schemas.microsoft.com/office/powerpoint/2010/main" id="1" dur="indefinite" restart="never" nodeType="tmRoot"/>
+        <p:cTn id="1" dur="indefinite" restart="never" nodeType="tmRoot"/>
       </p:par>
     </p:tnLst>
   </p:timing>
@@ -6397,14 +6393,14 @@
             <a:noFill/>
           </a:ln>
           <a:extLst>
-            <a:ext uri="{909E8E84-426E-40dd-AFC4-6F175D3DCCD1}">
+            <a:ext uri="{909E8E84-426E-40DD-AFC4-6F175D3DCCD1}">
               <a14:hiddenFill xmlns:a14="http://schemas.microsoft.com/office/drawing/2010/main">
                 <a:solidFill>
                   <a:schemeClr val="accent1"/>
                 </a:solidFill>
               </a14:hiddenFill>
             </a:ext>
-            <a:ext uri="{91240B29-F687-4f45-9708-019B960494DF}">
+            <a:ext uri="{91240B29-F687-4F45-9708-019B960494DF}">
               <a14:hiddenLine xmlns:a14="http://schemas.microsoft.com/office/drawing/2010/main" w="9525">
                 <a:solidFill>
                   <a:schemeClr val="tx1"/>
@@ -6799,7 +6795,7 @@
   <p:timing>
     <p:tnLst>
       <p:par>
-        <p:cTn xmlns:p14="http://schemas.microsoft.com/office/powerpoint/2010/main" id="1" dur="indefinite" restart="never" nodeType="tmRoot"/>
+        <p:cTn id="1" dur="indefinite" restart="never" nodeType="tmRoot"/>
       </p:par>
     </p:tnLst>
   </p:timing>
@@ -6857,14 +6853,14 @@
             <a:noFill/>
           </a:ln>
           <a:extLst>
-            <a:ext uri="{909E8E84-426E-40dd-AFC4-6F175D3DCCD1}">
+            <a:ext uri="{909E8E84-426E-40DD-AFC4-6F175D3DCCD1}">
               <a14:hiddenFill xmlns:a14="http://schemas.microsoft.com/office/drawing/2010/main">
                 <a:solidFill>
                   <a:schemeClr val="accent1"/>
                 </a:solidFill>
               </a14:hiddenFill>
             </a:ext>
-            <a:ext uri="{91240B29-F687-4f45-9708-019B960494DF}">
+            <a:ext uri="{91240B29-F687-4F45-9708-019B960494DF}">
               <a14:hiddenLine xmlns:a14="http://schemas.microsoft.com/office/drawing/2010/main" w="9525">
                 <a:solidFill>
                   <a:schemeClr val="tx1"/>
@@ -6952,7 +6948,23 @@
                   <a:schemeClr val="accent1"/>
                 </a:solidFill>
               </a:rPr>
-              <a:t>BUC3: Stundeplan anzeigen</a:t>
+              <a:t>BUC3: </a:t>
+            </a:r>
+            <a:r>
+              <a:rPr lang="de-DE" sz="3200" b="1" dirty="0" smtClean="0">
+                <a:solidFill>
+                  <a:schemeClr val="accent1"/>
+                </a:solidFill>
+              </a:rPr>
+              <a:t>Stundenplan </a:t>
+            </a:r>
+            <a:r>
+              <a:rPr lang="de-DE" sz="3200" b="1" dirty="0" smtClean="0">
+                <a:solidFill>
+                  <a:schemeClr val="accent1"/>
+                </a:solidFill>
+              </a:rPr>
+              <a:t>anzeigen</a:t>
             </a:r>
           </a:p>
           <a:p>
@@ -7121,7 +7133,7 @@
   <p:timing>
     <p:tnLst>
       <p:par>
-        <p:cTn xmlns:p14="http://schemas.microsoft.com/office/powerpoint/2010/main" id="1" dur="indefinite" restart="never" nodeType="tmRoot"/>
+        <p:cTn id="1" dur="indefinite" restart="never" nodeType="tmRoot"/>
       </p:par>
     </p:tnLst>
   </p:timing>
@@ -7179,14 +7191,14 @@
             <a:noFill/>
           </a:ln>
           <a:extLst>
-            <a:ext uri="{909E8E84-426E-40dd-AFC4-6F175D3DCCD1}">
+            <a:ext uri="{909E8E84-426E-40DD-AFC4-6F175D3DCCD1}">
               <a14:hiddenFill xmlns:a14="http://schemas.microsoft.com/office/drawing/2010/main">
                 <a:solidFill>
                   <a:schemeClr val="accent1"/>
                 </a:solidFill>
               </a14:hiddenFill>
             </a:ext>
-            <a:ext uri="{91240B29-F687-4f45-9708-019B960494DF}">
+            <a:ext uri="{91240B29-F687-4F45-9708-019B960494DF}">
               <a14:hiddenLine xmlns:a14="http://schemas.microsoft.com/office/drawing/2010/main" w="9525">
                 <a:solidFill>
                   <a:schemeClr val="tx1"/>
@@ -7357,7 +7369,15 @@
             </a:pPr>
             <a:r>
               <a:rPr lang="de-DE" sz="2800" dirty="0"/>
-              <a:t>Das System sollte dem Benutzer die Möglichkeit bieten bereits erfasste Zeitpräferenzen eines Dozenten anzeigen und bearbeiten zu können.</a:t>
+              <a:t>Das System </a:t>
+            </a:r>
+            <a:r>
+              <a:rPr lang="de-DE" sz="2800" dirty="0" smtClean="0"/>
+              <a:t>soll </a:t>
+            </a:r>
+            <a:r>
+              <a:rPr lang="de-DE" sz="2800" dirty="0"/>
+              <a:t>dem Benutzer die Möglichkeit bieten bereits erfasste Zeitpräferenzen eines Dozenten anzeigen und bearbeiten zu können.</a:t>
             </a:r>
             <a:endParaRPr lang="de-DE" sz="2800" dirty="0" smtClean="0"/>
           </a:p>
@@ -7386,7 +7406,7 @@
   <p:timing>
     <p:tnLst>
       <p:par>
-        <p:cTn xmlns:p14="http://schemas.microsoft.com/office/powerpoint/2010/main" id="1" dur="indefinite" restart="never" nodeType="tmRoot"/>
+        <p:cTn id="1" dur="indefinite" restart="never" nodeType="tmRoot"/>
       </p:par>
     </p:tnLst>
   </p:timing>
@@ -7444,14 +7464,14 @@
             <a:noFill/>
           </a:ln>
           <a:extLst>
-            <a:ext uri="{909E8E84-426E-40dd-AFC4-6F175D3DCCD1}">
+            <a:ext uri="{909E8E84-426E-40DD-AFC4-6F175D3DCCD1}">
               <a14:hiddenFill xmlns:a14="http://schemas.microsoft.com/office/drawing/2010/main">
                 <a:solidFill>
                   <a:schemeClr val="accent1"/>
                 </a:solidFill>
               </a14:hiddenFill>
             </a:ext>
-            <a:ext uri="{91240B29-F687-4f45-9708-019B960494DF}">
+            <a:ext uri="{91240B29-F687-4F45-9708-019B960494DF}">
               <a14:hiddenLine xmlns:a14="http://schemas.microsoft.com/office/drawing/2010/main" w="9525">
                 <a:solidFill>
                   <a:schemeClr val="tx1"/>
@@ -7655,7 +7675,7 @@
   <p:timing>
     <p:tnLst>
       <p:par>
-        <p:cTn xmlns:p14="http://schemas.microsoft.com/office/powerpoint/2010/main" id="1" dur="indefinite" restart="never" nodeType="tmRoot"/>
+        <p:cTn id="1" dur="indefinite" restart="never" nodeType="tmRoot"/>
       </p:par>
     </p:tnLst>
   </p:timing>
@@ -7713,14 +7733,14 @@
             <a:noFill/>
           </a:ln>
           <a:extLst>
-            <a:ext uri="{909E8E84-426E-40dd-AFC4-6F175D3DCCD1}">
+            <a:ext uri="{909E8E84-426E-40DD-AFC4-6F175D3DCCD1}">
               <a14:hiddenFill xmlns:a14="http://schemas.microsoft.com/office/drawing/2010/main">
                 <a:solidFill>
                   <a:schemeClr val="accent1"/>
                 </a:solidFill>
               </a14:hiddenFill>
             </a:ext>
-            <a:ext uri="{91240B29-F687-4f45-9708-019B960494DF}">
+            <a:ext uri="{91240B29-F687-4F45-9708-019B960494DF}">
               <a14:hiddenLine xmlns:a14="http://schemas.microsoft.com/office/drawing/2010/main" w="9525">
                 <a:solidFill>
                   <a:schemeClr val="tx1"/>
@@ -7803,7 +7823,7 @@
           </a:prstGeom>
           <a:noFill/>
           <a:extLst>
-            <a:ext uri="{909E8E84-426E-40dd-AFC4-6F175D3DCCD1}">
+            <a:ext uri="{909E8E84-426E-40DD-AFC4-6F175D3DCCD1}">
               <a14:hiddenFill xmlns:a14="http://schemas.microsoft.com/office/drawing/2010/main">
                 <a:solidFill>
                   <a:srgbClr val="FFFFFF"/>
@@ -7826,7 +7846,7 @@
   <p:timing>
     <p:tnLst>
       <p:par>
-        <p:cTn xmlns:p14="http://schemas.microsoft.com/office/powerpoint/2010/main" id="1" dur="indefinite" restart="never" nodeType="tmRoot"/>
+        <p:cTn id="1" dur="indefinite" restart="never" nodeType="tmRoot"/>
       </p:par>
     </p:tnLst>
   </p:timing>
@@ -7884,14 +7904,14 @@
             <a:noFill/>
           </a:ln>
           <a:extLst>
-            <a:ext uri="{909E8E84-426E-40dd-AFC4-6F175D3DCCD1}">
+            <a:ext uri="{909E8E84-426E-40DD-AFC4-6F175D3DCCD1}">
               <a14:hiddenFill xmlns:a14="http://schemas.microsoft.com/office/drawing/2010/main">
                 <a:solidFill>
                   <a:schemeClr val="accent1"/>
                 </a:solidFill>
               </a14:hiddenFill>
             </a:ext>
-            <a:ext uri="{91240B29-F687-4f45-9708-019B960494DF}">
+            <a:ext uri="{91240B29-F687-4F45-9708-019B960494DF}">
               <a14:hiddenLine xmlns:a14="http://schemas.microsoft.com/office/drawing/2010/main" w="9525">
                 <a:solidFill>
                   <a:schemeClr val="tx1"/>
@@ -7995,7 +8015,7 @@
   <p:timing>
     <p:tnLst>
       <p:par>
-        <p:cTn xmlns:p14="http://schemas.microsoft.com/office/powerpoint/2010/main" id="1" dur="indefinite" restart="never" nodeType="tmRoot"/>
+        <p:cTn id="1" dur="indefinite" restart="never" nodeType="tmRoot"/>
       </p:par>
     </p:tnLst>
   </p:timing>
@@ -8053,14 +8073,14 @@
             <a:noFill/>
           </a:ln>
           <a:extLst>
-            <a:ext uri="{909E8E84-426E-40dd-AFC4-6F175D3DCCD1}">
+            <a:ext uri="{909E8E84-426E-40DD-AFC4-6F175D3DCCD1}">
               <a14:hiddenFill xmlns:a14="http://schemas.microsoft.com/office/drawing/2010/main">
                 <a:solidFill>
                   <a:schemeClr val="accent1"/>
                 </a:solidFill>
               </a14:hiddenFill>
             </a:ext>
-            <a:ext uri="{91240B29-F687-4f45-9708-019B960494DF}">
+            <a:ext uri="{91240B29-F687-4F45-9708-019B960494DF}">
               <a14:hiddenLine xmlns:a14="http://schemas.microsoft.com/office/drawing/2010/main" w="9525">
                 <a:solidFill>
                   <a:schemeClr val="tx1"/>
@@ -8141,7 +8161,7 @@
           </a:prstGeom>
           <a:noFill/>
           <a:extLst>
-            <a:ext uri="{909E8E84-426E-40dd-AFC4-6F175D3DCCD1}">
+            <a:ext uri="{909E8E84-426E-40DD-AFC4-6F175D3DCCD1}">
               <a14:hiddenFill xmlns:a14="http://schemas.microsoft.com/office/drawing/2010/main">
                 <a:solidFill>
                   <a:srgbClr val="FFFFFF"/>
@@ -8288,7 +8308,7 @@
   <p:timing>
     <p:tnLst>
       <p:par>
-        <p:cTn xmlns:p14="http://schemas.microsoft.com/office/powerpoint/2010/main" id="1" dur="indefinite" restart="never" nodeType="tmRoot"/>
+        <p:cTn id="1" dur="indefinite" restart="never" nodeType="tmRoot"/>
       </p:par>
     </p:tnLst>
   </p:timing>
@@ -8346,14 +8366,14 @@
             <a:noFill/>
           </a:ln>
           <a:extLst>
-            <a:ext uri="{909E8E84-426E-40dd-AFC4-6F175D3DCCD1}">
+            <a:ext uri="{909E8E84-426E-40DD-AFC4-6F175D3DCCD1}">
               <a14:hiddenFill xmlns:a14="http://schemas.microsoft.com/office/drawing/2010/main">
                 <a:solidFill>
                   <a:schemeClr val="accent1"/>
                 </a:solidFill>
               </a14:hiddenFill>
             </a:ext>
-            <a:ext uri="{91240B29-F687-4f45-9708-019B960494DF}">
+            <a:ext uri="{91240B29-F687-4F45-9708-019B960494DF}">
               <a14:hiddenLine xmlns:a14="http://schemas.microsoft.com/office/drawing/2010/main" w="9525">
                 <a:solidFill>
                   <a:schemeClr val="tx1"/>
@@ -8437,14 +8457,14 @@
             <a:noFill/>
           </a:ln>
           <a:extLst>
-            <a:ext uri="{909E8E84-426E-40dd-AFC4-6F175D3DCCD1}">
+            <a:ext uri="{909E8E84-426E-40DD-AFC4-6F175D3DCCD1}">
               <a14:hiddenFill xmlns:a14="http://schemas.microsoft.com/office/drawing/2010/main">
                 <a:solidFill>
                   <a:schemeClr val="accent1"/>
                 </a:solidFill>
               </a14:hiddenFill>
             </a:ext>
-            <a:ext uri="{91240B29-F687-4f45-9708-019B960494DF}">
+            <a:ext uri="{91240B29-F687-4F45-9708-019B960494DF}">
               <a14:hiddenLine xmlns:a14="http://schemas.microsoft.com/office/drawing/2010/main" w="9525">
                 <a:solidFill>
                   <a:schemeClr val="tx1"/>
@@ -8638,7 +8658,7 @@
   <p:timing>
     <p:tnLst>
       <p:par>
-        <p:cTn xmlns:p14="http://schemas.microsoft.com/office/powerpoint/2010/main" id="1" dur="indefinite" restart="never" nodeType="tmRoot"/>
+        <p:cTn id="1" dur="indefinite" restart="never" nodeType="tmRoot"/>
       </p:par>
     </p:tnLst>
   </p:timing>
@@ -8696,14 +8716,14 @@
             <a:noFill/>
           </a:ln>
           <a:extLst>
-            <a:ext uri="{909E8E84-426E-40dd-AFC4-6F175D3DCCD1}">
+            <a:ext uri="{909E8E84-426E-40DD-AFC4-6F175D3DCCD1}">
               <a14:hiddenFill xmlns:a14="http://schemas.microsoft.com/office/drawing/2010/main">
                 <a:solidFill>
                   <a:schemeClr val="accent1"/>
                 </a:solidFill>
               </a14:hiddenFill>
             </a:ext>
-            <a:ext uri="{91240B29-F687-4f45-9708-019B960494DF}">
+            <a:ext uri="{91240B29-F687-4F45-9708-019B960494DF}">
               <a14:hiddenLine xmlns:a14="http://schemas.microsoft.com/office/drawing/2010/main" w="9525">
                 <a:solidFill>
                   <a:schemeClr val="tx1"/>
@@ -8787,14 +8807,14 @@
             <a:noFill/>
           </a:ln>
           <a:extLst>
-            <a:ext uri="{909E8E84-426E-40dd-AFC4-6F175D3DCCD1}">
+            <a:ext uri="{909E8E84-426E-40DD-AFC4-6F175D3DCCD1}">
               <a14:hiddenFill xmlns:a14="http://schemas.microsoft.com/office/drawing/2010/main">
                 <a:solidFill>
                   <a:schemeClr val="accent1"/>
                 </a:solidFill>
               </a14:hiddenFill>
             </a:ext>
-            <a:ext uri="{91240B29-F687-4f45-9708-019B960494DF}">
+            <a:ext uri="{91240B29-F687-4F45-9708-019B960494DF}">
               <a14:hiddenLine xmlns:a14="http://schemas.microsoft.com/office/drawing/2010/main" w="9525">
                 <a:solidFill>
                   <a:schemeClr val="tx1"/>
@@ -8997,7 +9017,7 @@
   <p:timing>
     <p:tnLst>
       <p:par>
-        <p:cTn xmlns:p14="http://schemas.microsoft.com/office/powerpoint/2010/main" id="1" dur="indefinite" restart="never" nodeType="tmRoot"/>
+        <p:cTn id="1" dur="indefinite" restart="never" nodeType="tmRoot"/>
       </p:par>
     </p:tnLst>
   </p:timing>
@@ -9055,14 +9075,14 @@
             <a:noFill/>
           </a:ln>
           <a:extLst>
-            <a:ext uri="{909E8E84-426E-40dd-AFC4-6F175D3DCCD1}">
+            <a:ext uri="{909E8E84-426E-40DD-AFC4-6F175D3DCCD1}">
               <a14:hiddenFill xmlns:a14="http://schemas.microsoft.com/office/drawing/2010/main">
                 <a:solidFill>
                   <a:schemeClr val="accent1"/>
                 </a:solidFill>
               </a14:hiddenFill>
             </a:ext>
-            <a:ext uri="{91240B29-F687-4f45-9708-019B960494DF}">
+            <a:ext uri="{91240B29-F687-4F45-9708-019B960494DF}">
               <a14:hiddenLine xmlns:a14="http://schemas.microsoft.com/office/drawing/2010/main" w="9525">
                 <a:solidFill>
                   <a:schemeClr val="tx1"/>
@@ -9146,14 +9166,14 @@
             <a:noFill/>
           </a:ln>
           <a:extLst>
-            <a:ext uri="{909E8E84-426E-40dd-AFC4-6F175D3DCCD1}">
+            <a:ext uri="{909E8E84-426E-40DD-AFC4-6F175D3DCCD1}">
               <a14:hiddenFill xmlns:a14="http://schemas.microsoft.com/office/drawing/2010/main">
                 <a:solidFill>
                   <a:schemeClr val="accent1"/>
                 </a:solidFill>
               </a14:hiddenFill>
             </a:ext>
-            <a:ext uri="{91240B29-F687-4f45-9708-019B960494DF}">
+            <a:ext uri="{91240B29-F687-4F45-9708-019B960494DF}">
               <a14:hiddenLine xmlns:a14="http://schemas.microsoft.com/office/drawing/2010/main" w="9525">
                 <a:solidFill>
                   <a:schemeClr val="tx1"/>
@@ -9357,7 +9377,7 @@
   <p:timing>
     <p:tnLst>
       <p:par>
-        <p:cTn xmlns:p14="http://schemas.microsoft.com/office/powerpoint/2010/main" id="1" dur="indefinite" restart="never" nodeType="tmRoot"/>
+        <p:cTn id="1" dur="indefinite" restart="never" nodeType="tmRoot"/>
       </p:par>
     </p:tnLst>
   </p:timing>
@@ -9415,14 +9435,14 @@
             <a:noFill/>
           </a:ln>
           <a:extLst>
-            <a:ext uri="{909E8E84-426E-40dd-AFC4-6F175D3DCCD1}">
+            <a:ext uri="{909E8E84-426E-40DD-AFC4-6F175D3DCCD1}">
               <a14:hiddenFill xmlns:a14="http://schemas.microsoft.com/office/drawing/2010/main">
                 <a:solidFill>
                   <a:schemeClr val="accent1"/>
                 </a:solidFill>
               </a14:hiddenFill>
             </a:ext>
-            <a:ext uri="{91240B29-F687-4f45-9708-019B960494DF}">
+            <a:ext uri="{91240B29-F687-4F45-9708-019B960494DF}">
               <a14:hiddenLine xmlns:a14="http://schemas.microsoft.com/office/drawing/2010/main" w="9525">
                 <a:solidFill>
                   <a:schemeClr val="tx1"/>
@@ -9506,14 +9526,14 @@
             <a:noFill/>
           </a:ln>
           <a:extLst>
-            <a:ext uri="{909E8E84-426E-40dd-AFC4-6F175D3DCCD1}">
+            <a:ext uri="{909E8E84-426E-40DD-AFC4-6F175D3DCCD1}">
               <a14:hiddenFill xmlns:a14="http://schemas.microsoft.com/office/drawing/2010/main">
                 <a:solidFill>
                   <a:schemeClr val="accent1"/>
                 </a:solidFill>
               </a14:hiddenFill>
             </a:ext>
-            <a:ext uri="{91240B29-F687-4f45-9708-019B960494DF}">
+            <a:ext uri="{91240B29-F687-4F45-9708-019B960494DF}">
               <a14:hiddenLine xmlns:a14="http://schemas.microsoft.com/office/drawing/2010/main" w="9525">
                 <a:solidFill>
                   <a:schemeClr val="tx1"/>
@@ -9710,7 +9730,7 @@
   <p:timing>
     <p:tnLst>
       <p:par>
-        <p:cTn xmlns:p14="http://schemas.microsoft.com/office/powerpoint/2010/main" id="1" dur="indefinite" restart="never" nodeType="tmRoot"/>
+        <p:cTn id="1" dur="indefinite" restart="never" nodeType="tmRoot"/>
       </p:par>
     </p:tnLst>
   </p:timing>
@@ -9768,14 +9788,14 @@
             <a:noFill/>
           </a:ln>
           <a:extLst>
-            <a:ext uri="{909E8E84-426E-40dd-AFC4-6F175D3DCCD1}">
+            <a:ext uri="{909E8E84-426E-40DD-AFC4-6F175D3DCCD1}">
               <a14:hiddenFill xmlns:a14="http://schemas.microsoft.com/office/drawing/2010/main">
                 <a:solidFill>
                   <a:schemeClr val="accent1"/>
                 </a:solidFill>
               </a14:hiddenFill>
             </a:ext>
-            <a:ext uri="{91240B29-F687-4f45-9708-019B960494DF}">
+            <a:ext uri="{91240B29-F687-4F45-9708-019B960494DF}">
               <a14:hiddenLine xmlns:a14="http://schemas.microsoft.com/office/drawing/2010/main" w="9525">
                 <a:solidFill>
                   <a:schemeClr val="tx1"/>
@@ -10014,7 +10034,7 @@
   <p:timing>
     <p:tnLst>
       <p:par>
-        <p:cTn xmlns:p14="http://schemas.microsoft.com/office/powerpoint/2010/main" id="1" dur="indefinite" restart="never" nodeType="tmRoot"/>
+        <p:cTn id="1" dur="indefinite" restart="never" nodeType="tmRoot"/>
       </p:par>
     </p:tnLst>
   </p:timing>
@@ -10072,14 +10092,14 @@
             <a:noFill/>
           </a:ln>
           <a:extLst>
-            <a:ext uri="{909E8E84-426E-40dd-AFC4-6F175D3DCCD1}">
+            <a:ext uri="{909E8E84-426E-40DD-AFC4-6F175D3DCCD1}">
               <a14:hiddenFill xmlns:a14="http://schemas.microsoft.com/office/drawing/2010/main">
                 <a:solidFill>
                   <a:schemeClr val="accent1"/>
                 </a:solidFill>
               </a14:hiddenFill>
             </a:ext>
-            <a:ext uri="{91240B29-F687-4f45-9708-019B960494DF}">
+            <a:ext uri="{91240B29-F687-4F45-9708-019B960494DF}">
               <a14:hiddenLine xmlns:a14="http://schemas.microsoft.com/office/drawing/2010/main" w="9525">
                 <a:solidFill>
                   <a:schemeClr val="tx1"/>
@@ -10308,7 +10328,7 @@
   <p:timing>
     <p:tnLst>
       <p:par>
-        <p:cTn xmlns:p14="http://schemas.microsoft.com/office/powerpoint/2010/main" id="1" dur="indefinite" restart="never" nodeType="tmRoot"/>
+        <p:cTn id="1" dur="indefinite" restart="never" nodeType="tmRoot"/>
       </p:par>
     </p:tnLst>
   </p:timing>

</xml_diff>